<commit_message>
Work on THRILL Workshop talk
</commit_message>
<xml_diff>
--- a/book/OPOSSUM THRILL Workshop 2023.pptx
+++ b/book/OPOSSUM THRILL Workshop 2023.pptx
@@ -17,8 +17,8 @@
     <p:sldId id="258" r:id="rId5"/>
     <p:sldId id="260" r:id="rId6"/>
     <p:sldId id="261" r:id="rId7"/>
-    <p:sldId id="264" r:id="rId8"/>
-    <p:sldId id="262" r:id="rId9"/>
+    <p:sldId id="262" r:id="rId8"/>
+    <p:sldId id="264" r:id="rId9"/>
     <p:sldId id="263" r:id="rId10"/>
   </p:sldIdLst>
   <p:sldSz cx="9144000" cy="5143500" type="screen16x9"/>
@@ -2655,6 +2655,19 @@
             <a:off x="62979" y="1104504"/>
             <a:ext cx="1099064" cy="590668"/>
           </a:xfrm>
+          <a:prstGeom prst="rect">
+            <a:avLst/>
+          </a:prstGeom>
+          <a:ln>
+            <a:noFill/>
+          </a:ln>
+          <a:effectLst>
+            <a:outerShdw blurRad="292100" dist="139700" dir="2700000" algn="tl" rotWithShape="0">
+              <a:srgbClr val="333333">
+                <a:alpha val="65000"/>
+              </a:srgbClr>
+            </a:outerShdw>
+          </a:effectLst>
         </p:spPr>
       </p:pic>
       <p:pic>
@@ -2679,12 +2692,22 @@
         </p:blipFill>
         <p:spPr>
           <a:xfrm>
-            <a:off x="475355" y="2483340"/>
+            <a:off x="366951" y="2767802"/>
             <a:ext cx="824056" cy="824056"/>
           </a:xfrm>
           <a:prstGeom prst="rect">
             <a:avLst/>
           </a:prstGeom>
+          <a:ln>
+            <a:noFill/>
+          </a:ln>
+          <a:effectLst>
+            <a:outerShdw blurRad="292100" dist="139700" dir="2700000" algn="tl" rotWithShape="0">
+              <a:srgbClr val="333333">
+                <a:alpha val="65000"/>
+              </a:srgbClr>
+            </a:outerShdw>
+          </a:effectLst>
         </p:spPr>
       </p:pic>
       <p:pic>
@@ -2708,12 +2731,22 @@
         </p:blipFill>
         <p:spPr>
           <a:xfrm>
-            <a:off x="330694" y="1766092"/>
+            <a:off x="110507" y="2042971"/>
             <a:ext cx="1595043" cy="425037"/>
           </a:xfrm>
           <a:prstGeom prst="rect">
             <a:avLst/>
           </a:prstGeom>
+          <a:ln>
+            <a:noFill/>
+          </a:ln>
+          <a:effectLst>
+            <a:outerShdw blurRad="292100" dist="139700" dir="2700000" algn="tl" rotWithShape="0">
+              <a:srgbClr val="333333">
+                <a:alpha val="65000"/>
+              </a:srgbClr>
+            </a:outerShdw>
+          </a:effectLst>
         </p:spPr>
       </p:pic>
       <p:pic>
@@ -2738,12 +2771,22 @@
         </p:blipFill>
         <p:spPr>
           <a:xfrm>
-            <a:off x="617186" y="3686223"/>
+            <a:off x="199883" y="3816379"/>
             <a:ext cx="1794424" cy="897212"/>
           </a:xfrm>
           <a:prstGeom prst="rect">
             <a:avLst/>
           </a:prstGeom>
+          <a:ln>
+            <a:noFill/>
+          </a:ln>
+          <a:effectLst>
+            <a:outerShdw blurRad="292100" dist="139700" dir="2700000" algn="tl" rotWithShape="0">
+              <a:srgbClr val="333333">
+                <a:alpha val="65000"/>
+              </a:srgbClr>
+            </a:outerShdw>
+          </a:effectLst>
         </p:spPr>
       </p:pic>
       <p:pic>
@@ -2768,12 +2811,22 @@
         </p:blipFill>
         <p:spPr>
           <a:xfrm>
-            <a:off x="2034482" y="1094943"/>
+            <a:off x="1393144" y="1215172"/>
             <a:ext cx="1524000" cy="857250"/>
           </a:xfrm>
           <a:prstGeom prst="rect">
             <a:avLst/>
           </a:prstGeom>
+          <a:ln>
+            <a:noFill/>
+          </a:ln>
+          <a:effectLst>
+            <a:outerShdw blurRad="292100" dist="139700" dir="2700000" algn="tl" rotWithShape="0">
+              <a:srgbClr val="333333">
+                <a:alpha val="65000"/>
+              </a:srgbClr>
+            </a:outerShdw>
+          </a:effectLst>
         </p:spPr>
       </p:pic>
       <p:pic>
@@ -2798,12 +2851,22 @@
         </p:blipFill>
         <p:spPr>
           <a:xfrm>
-            <a:off x="2290442" y="2226071"/>
+            <a:off x="1774054" y="2607161"/>
             <a:ext cx="762180" cy="762180"/>
           </a:xfrm>
           <a:prstGeom prst="rect">
             <a:avLst/>
           </a:prstGeom>
+          <a:ln>
+            <a:noFill/>
+          </a:ln>
+          <a:effectLst>
+            <a:outerShdw blurRad="292100" dist="139700" dir="2700000" algn="tl" rotWithShape="0">
+              <a:srgbClr val="333333">
+                <a:alpha val="65000"/>
+              </a:srgbClr>
+            </a:outerShdw>
+          </a:effectLst>
         </p:spPr>
       </p:pic>
       <p:pic>
@@ -2834,7 +2897,7 @@
         </p:blipFill>
         <p:spPr>
           <a:xfrm>
-            <a:off x="7995413" y="1104504"/>
+            <a:off x="7733699" y="3239199"/>
             <a:ext cx="801149" cy="801149"/>
           </a:xfrm>
           <a:prstGeom prst="rect">
@@ -2858,8 +2921,8 @@
         </p:nvSpPr>
         <p:spPr>
           <a:xfrm>
-            <a:off x="4455814" y="1505078"/>
-            <a:ext cx="2762449" cy="3341930"/>
+            <a:off x="3173235" y="1327121"/>
+            <a:ext cx="4961039" cy="1943321"/>
           </a:xfrm>
           <a:prstGeom prst="rect">
             <a:avLst/>
@@ -3023,9 +3086,487 @@
           </a:lstStyle>
           <a:p>
             <a:r>
-              <a:rPr lang="de-DE"/>
-              <a:t>sdf</a:t>
-            </a:r>
+              <a:rPr lang="de-DE" dirty="0" err="1"/>
+              <a:t>Proprietary</a:t>
+            </a:r>
+            <a:r>
+              <a:rPr lang="de-DE" dirty="0"/>
+              <a:t> </a:t>
+            </a:r>
+            <a:r>
+              <a:rPr lang="de-DE" dirty="0" err="1"/>
+              <a:t>licences</a:t>
+            </a:r>
+            <a:endParaRPr lang="de-DE" dirty="0"/>
+          </a:p>
+          <a:p>
+            <a:r>
+              <a:rPr lang="de-DE" dirty="0"/>
+              <a:t>Not well-</a:t>
+            </a:r>
+            <a:r>
+              <a:rPr lang="de-DE" dirty="0" err="1"/>
+              <a:t>suited</a:t>
+            </a:r>
+            <a:r>
+              <a:rPr lang="de-DE" dirty="0"/>
+              <a:t> </a:t>
+            </a:r>
+            <a:r>
+              <a:rPr lang="de-DE" dirty="0" err="1"/>
+              <a:t>for</a:t>
+            </a:r>
+            <a:r>
+              <a:rPr lang="de-DE" dirty="0"/>
+              <a:t> large </a:t>
+            </a:r>
+            <a:r>
+              <a:rPr lang="de-DE" dirty="0" err="1"/>
+              <a:t>size</a:t>
+            </a:r>
+            <a:r>
+              <a:rPr lang="de-DE" dirty="0"/>
+              <a:t> </a:t>
+            </a:r>
+            <a:r>
+              <a:rPr lang="de-DE" dirty="0" err="1"/>
+              <a:t>laser</a:t>
+            </a:r>
+            <a:r>
+              <a:rPr lang="de-DE" dirty="0"/>
+              <a:t> </a:t>
+            </a:r>
+            <a:r>
+              <a:rPr lang="de-DE" dirty="0" err="1"/>
+              <a:t>systems</a:t>
+            </a:r>
+            <a:r>
+              <a:rPr lang="de-DE" dirty="0"/>
+              <a:t> (e.g. ghost </a:t>
+            </a:r>
+            <a:r>
+              <a:rPr lang="de-DE" dirty="0" err="1"/>
+              <a:t>focus</a:t>
+            </a:r>
+            <a:r>
+              <a:rPr lang="de-DE" dirty="0"/>
+              <a:t> </a:t>
+            </a:r>
+            <a:r>
+              <a:rPr lang="de-DE" dirty="0" err="1"/>
+              <a:t>calculation</a:t>
+            </a:r>
+            <a:r>
+              <a:rPr lang="de-DE" dirty="0"/>
+              <a:t> </a:t>
+            </a:r>
+            <a:r>
+              <a:rPr lang="de-DE" dirty="0" err="1"/>
+              <a:t>difficult</a:t>
+            </a:r>
+            <a:r>
+              <a:rPr lang="de-DE" dirty="0"/>
+              <a:t>)</a:t>
+            </a:r>
+          </a:p>
+          <a:p>
+            <a:r>
+              <a:rPr lang="de-DE" dirty="0"/>
+              <a:t>Custom code </a:t>
+            </a:r>
+            <a:r>
+              <a:rPr lang="de-DE" dirty="0" err="1"/>
+              <a:t>hard</a:t>
+            </a:r>
+            <a:r>
+              <a:rPr lang="de-DE" dirty="0"/>
+              <a:t> / impossible </a:t>
+            </a:r>
+            <a:r>
+              <a:rPr lang="de-DE" dirty="0" err="1"/>
+              <a:t>to</a:t>
+            </a:r>
+            <a:r>
+              <a:rPr lang="de-DE" dirty="0"/>
+              <a:t> </a:t>
+            </a:r>
+            <a:r>
+              <a:rPr lang="de-DE" dirty="0" err="1"/>
+              <a:t>integrate</a:t>
+            </a:r>
+            <a:endParaRPr lang="de-DE" dirty="0"/>
+          </a:p>
+          <a:p>
+            <a:endParaRPr lang="de-DE" dirty="0"/>
+          </a:p>
+        </p:txBody>
+      </p:sp>
+      <p:sp>
+        <p:nvSpPr>
+          <p:cNvPr id="3" name="Textfeld 2">
+            <a:extLst>
+              <a:ext uri="{FF2B5EF4-FFF2-40B4-BE49-F238E27FC236}">
+                <a16:creationId xmlns:a16="http://schemas.microsoft.com/office/drawing/2014/main" id="{FE17EB67-D035-4ABE-B08B-B3B0A0D61284}"/>
+              </a:ext>
+            </a:extLst>
+          </p:cNvPr>
+          <p:cNvSpPr txBox="1"/>
+          <p:nvPr/>
+        </p:nvSpPr>
+        <p:spPr>
+          <a:xfrm>
+            <a:off x="3206131" y="949728"/>
+            <a:ext cx="2249334" cy="369332"/>
+          </a:xfrm>
+          <a:prstGeom prst="rect">
+            <a:avLst/>
+          </a:prstGeom>
+        </p:spPr>
+        <p:txBody>
+          <a:bodyPr vert="horz" wrap="none" lIns="91440" tIns="45720" rIns="91440" bIns="45720" rtlCol="0" anchor="t">
+            <a:spAutoFit/>
+          </a:bodyPr>
+          <a:lstStyle/>
+          <a:p>
+            <a:pPr algn="l"/>
+            <a:r>
+              <a:rPr lang="de-DE" b="1" dirty="0" err="1"/>
+              <a:t>Existing</a:t>
+            </a:r>
+            <a:r>
+              <a:rPr lang="de-DE" b="1" dirty="0"/>
+              <a:t> </a:t>
+            </a:r>
+            <a:r>
+              <a:rPr lang="de-DE" b="1" dirty="0" err="1"/>
+              <a:t>solutions</a:t>
+            </a:r>
+            <a:r>
+              <a:rPr lang="de-DE" b="1" dirty="0"/>
+              <a:t>:</a:t>
+            </a:r>
+          </a:p>
+        </p:txBody>
+      </p:sp>
+      <p:sp>
+        <p:nvSpPr>
+          <p:cNvPr id="12" name="Textfeld 11">
+            <a:extLst>
+              <a:ext uri="{FF2B5EF4-FFF2-40B4-BE49-F238E27FC236}">
+                <a16:creationId xmlns:a16="http://schemas.microsoft.com/office/drawing/2014/main" id="{12313EBB-81A0-4DF1-8E57-88F805BB07C4}"/>
+              </a:ext>
+            </a:extLst>
+          </p:cNvPr>
+          <p:cNvSpPr txBox="1"/>
+          <p:nvPr/>
+        </p:nvSpPr>
+        <p:spPr>
+          <a:xfrm>
+            <a:off x="3206131" y="2734921"/>
+            <a:ext cx="1774845" cy="369332"/>
+          </a:xfrm>
+          <a:prstGeom prst="rect">
+            <a:avLst/>
+          </a:prstGeom>
+        </p:spPr>
+        <p:txBody>
+          <a:bodyPr vert="horz" wrap="none" lIns="91440" tIns="45720" rIns="91440" bIns="45720" rtlCol="0" anchor="t">
+            <a:spAutoFit/>
+          </a:bodyPr>
+          <a:lstStyle/>
+          <a:p>
+            <a:pPr algn="l"/>
+            <a:r>
+              <a:rPr lang="de-DE" b="1" dirty="0" err="1"/>
+              <a:t>Our</a:t>
+            </a:r>
+            <a:r>
+              <a:rPr lang="de-DE" b="1" dirty="0"/>
+              <a:t> </a:t>
+            </a:r>
+            <a:r>
+              <a:rPr lang="de-DE" b="1" dirty="0" err="1"/>
+              <a:t>approach</a:t>
+            </a:r>
+            <a:r>
+              <a:rPr lang="de-DE" b="1" dirty="0"/>
+              <a:t>:</a:t>
+            </a:r>
+          </a:p>
+        </p:txBody>
+      </p:sp>
+      <p:sp>
+        <p:nvSpPr>
+          <p:cNvPr id="14" name="Inhaltsplatzhalter 2">
+            <a:extLst>
+              <a:ext uri="{FF2B5EF4-FFF2-40B4-BE49-F238E27FC236}">
+                <a16:creationId xmlns:a16="http://schemas.microsoft.com/office/drawing/2014/main" id="{2176B2A1-4950-4D0E-8D53-6F08A1147725}"/>
+              </a:ext>
+            </a:extLst>
+          </p:cNvPr>
+          <p:cNvSpPr txBox="1">
+            <a:spLocks/>
+          </p:cNvSpPr>
+          <p:nvPr/>
+        </p:nvSpPr>
+        <p:spPr>
+          <a:xfrm>
+            <a:off x="3206130" y="3104253"/>
+            <a:ext cx="5625049" cy="1609338"/>
+          </a:xfrm>
+          <a:prstGeom prst="rect">
+            <a:avLst/>
+          </a:prstGeom>
+        </p:spPr>
+        <p:txBody>
+          <a:bodyPr vert="horz" lIns="91440" tIns="45720" rIns="91440" bIns="45720" rtlCol="0">
+            <a:noAutofit/>
+          </a:bodyPr>
+          <a:lstStyle>
+            <a:lvl1pPr marL="257175" indent="-257175" algn="l" defTabSz="342900" rtl="0" eaLnBrk="1" latinLnBrk="0" hangingPunct="1">
+              <a:spcBef>
+                <a:spcPct val="20000"/>
+              </a:spcBef>
+              <a:buClr>
+                <a:srgbClr val="FDBB63"/>
+              </a:buClr>
+              <a:buFont typeface="Wingdings" charset="2"/>
+              <a:buChar char="§"/>
+              <a:defRPr sz="1800" kern="1200">
+                <a:solidFill>
+                  <a:srgbClr val="333333"/>
+                </a:solidFill>
+                <a:latin typeface="Arial"/>
+                <a:ea typeface="+mn-ea"/>
+                <a:cs typeface="Arial"/>
+              </a:defRPr>
+            </a:lvl1pPr>
+            <a:lvl2pPr marL="557213" indent="-214313" algn="l" defTabSz="342900" rtl="0" eaLnBrk="1" latinLnBrk="0" hangingPunct="1">
+              <a:spcBef>
+                <a:spcPct val="20000"/>
+              </a:spcBef>
+              <a:buClr>
+                <a:srgbClr val="FDBB63"/>
+              </a:buClr>
+              <a:buFont typeface="Wingdings" charset="2"/>
+              <a:buChar char="§"/>
+              <a:defRPr sz="1500" kern="1200">
+                <a:solidFill>
+                  <a:srgbClr val="333333"/>
+                </a:solidFill>
+                <a:latin typeface="Arial"/>
+                <a:ea typeface="+mn-ea"/>
+                <a:cs typeface="Arial"/>
+              </a:defRPr>
+            </a:lvl2pPr>
+            <a:lvl3pPr marL="857250" indent="-171450" algn="l" defTabSz="342900" rtl="0" eaLnBrk="1" latinLnBrk="0" hangingPunct="1">
+              <a:spcBef>
+                <a:spcPct val="20000"/>
+              </a:spcBef>
+              <a:buClr>
+                <a:srgbClr val="FDBB63"/>
+              </a:buClr>
+              <a:buFont typeface="Wingdings" charset="2"/>
+              <a:buChar char="§"/>
+              <a:defRPr sz="1350" kern="1200">
+                <a:solidFill>
+                  <a:srgbClr val="333333"/>
+                </a:solidFill>
+                <a:latin typeface="Arial"/>
+                <a:ea typeface="+mn-ea"/>
+                <a:cs typeface="Arial"/>
+              </a:defRPr>
+            </a:lvl3pPr>
+            <a:lvl4pPr marL="1200150" indent="-171450" algn="l" defTabSz="342900" rtl="0" eaLnBrk="1" latinLnBrk="0" hangingPunct="1">
+              <a:spcBef>
+                <a:spcPct val="20000"/>
+              </a:spcBef>
+              <a:buClr>
+                <a:srgbClr val="FDBB63"/>
+              </a:buClr>
+              <a:buFont typeface="Wingdings" charset="2"/>
+              <a:buChar char="§"/>
+              <a:defRPr sz="1200" kern="1200">
+                <a:solidFill>
+                  <a:srgbClr val="333333"/>
+                </a:solidFill>
+                <a:latin typeface="Arial"/>
+                <a:ea typeface="+mn-ea"/>
+                <a:cs typeface="Arial"/>
+              </a:defRPr>
+            </a:lvl4pPr>
+            <a:lvl5pPr marL="1543050" indent="-171450" algn="l" defTabSz="342900" rtl="0" eaLnBrk="1" latinLnBrk="0" hangingPunct="1">
+              <a:spcBef>
+                <a:spcPct val="20000"/>
+              </a:spcBef>
+              <a:buClr>
+                <a:srgbClr val="FDBB63"/>
+              </a:buClr>
+              <a:buFont typeface="Wingdings" charset="2"/>
+              <a:buChar char="§"/>
+              <a:defRPr sz="1050" kern="1200">
+                <a:solidFill>
+                  <a:srgbClr val="333333"/>
+                </a:solidFill>
+                <a:latin typeface="Arial"/>
+                <a:ea typeface="+mn-ea"/>
+                <a:cs typeface="Arial"/>
+              </a:defRPr>
+            </a:lvl5pPr>
+            <a:lvl6pPr marL="1885950" indent="-171450" algn="l" defTabSz="342900" rtl="0" eaLnBrk="1" latinLnBrk="0" hangingPunct="1">
+              <a:spcBef>
+                <a:spcPct val="20000"/>
+              </a:spcBef>
+              <a:buFont typeface="Arial"/>
+              <a:buChar char="•"/>
+              <a:defRPr sz="1500" kern="1200">
+                <a:solidFill>
+                  <a:schemeClr val="tx1"/>
+                </a:solidFill>
+                <a:latin typeface="+mn-lt"/>
+                <a:ea typeface="+mn-ea"/>
+                <a:cs typeface="+mn-cs"/>
+              </a:defRPr>
+            </a:lvl6pPr>
+            <a:lvl7pPr marL="2228850" indent="-171450" algn="l" defTabSz="342900" rtl="0" eaLnBrk="1" latinLnBrk="0" hangingPunct="1">
+              <a:spcBef>
+                <a:spcPct val="20000"/>
+              </a:spcBef>
+              <a:buFont typeface="Arial"/>
+              <a:buChar char="•"/>
+              <a:defRPr sz="1500" kern="1200">
+                <a:solidFill>
+                  <a:schemeClr val="tx1"/>
+                </a:solidFill>
+                <a:latin typeface="+mn-lt"/>
+                <a:ea typeface="+mn-ea"/>
+                <a:cs typeface="+mn-cs"/>
+              </a:defRPr>
+            </a:lvl7pPr>
+            <a:lvl8pPr marL="2571750" indent="-171450" algn="l" defTabSz="342900" rtl="0" eaLnBrk="1" latinLnBrk="0" hangingPunct="1">
+              <a:spcBef>
+                <a:spcPct val="20000"/>
+              </a:spcBef>
+              <a:buFont typeface="Arial"/>
+              <a:buChar char="•"/>
+              <a:defRPr sz="1500" kern="1200">
+                <a:solidFill>
+                  <a:schemeClr val="tx1"/>
+                </a:solidFill>
+                <a:latin typeface="+mn-lt"/>
+                <a:ea typeface="+mn-ea"/>
+                <a:cs typeface="+mn-cs"/>
+              </a:defRPr>
+            </a:lvl8pPr>
+            <a:lvl9pPr marL="2914650" indent="-171450" algn="l" defTabSz="342900" rtl="0" eaLnBrk="1" latinLnBrk="0" hangingPunct="1">
+              <a:spcBef>
+                <a:spcPct val="20000"/>
+              </a:spcBef>
+              <a:buFont typeface="Arial"/>
+              <a:buChar char="•"/>
+              <a:defRPr sz="1500" kern="1200">
+                <a:solidFill>
+                  <a:schemeClr val="tx1"/>
+                </a:solidFill>
+                <a:latin typeface="+mn-lt"/>
+                <a:ea typeface="+mn-ea"/>
+                <a:cs typeface="+mn-cs"/>
+              </a:defRPr>
+            </a:lvl9pPr>
+          </a:lstStyle>
+          <a:p>
+            <a:r>
+              <a:rPr lang="de-DE" dirty="0"/>
+              <a:t>Open source</a:t>
+            </a:r>
+          </a:p>
+          <a:p>
+            <a:r>
+              <a:rPr lang="de-DE" dirty="0" err="1"/>
+              <a:t>Platform</a:t>
+            </a:r>
+            <a:r>
+              <a:rPr lang="de-DE" dirty="0"/>
+              <a:t> </a:t>
+            </a:r>
+            <a:r>
+              <a:rPr lang="de-DE" dirty="0" err="1"/>
+              <a:t>for</a:t>
+            </a:r>
+            <a:r>
+              <a:rPr lang="de-DE" dirty="0"/>
+              <a:t> </a:t>
+            </a:r>
+            <a:r>
+              <a:rPr lang="de-DE" dirty="0" err="1"/>
+              <a:t>custom</a:t>
+            </a:r>
+            <a:r>
+              <a:rPr lang="de-DE" dirty="0"/>
+              <a:t> code </a:t>
+            </a:r>
+            <a:r>
+              <a:rPr lang="de-DE" dirty="0" err="1"/>
+              <a:t>integration</a:t>
+            </a:r>
+            <a:endParaRPr lang="de-DE" dirty="0"/>
+          </a:p>
+          <a:p>
+            <a:r>
+              <a:rPr lang="de-DE" dirty="0"/>
+              <a:t>Extensible </a:t>
+            </a:r>
+            <a:r>
+              <a:rPr lang="de-DE" dirty="0" err="1"/>
+              <a:t>to</a:t>
+            </a:r>
+            <a:r>
+              <a:rPr lang="de-DE" dirty="0"/>
+              <a:t> </a:t>
+            </a:r>
+            <a:r>
+              <a:rPr lang="de-DE" dirty="0" err="1"/>
+              <a:t>specific</a:t>
+            </a:r>
+            <a:r>
+              <a:rPr lang="de-DE" dirty="0"/>
+              <a:t> </a:t>
+            </a:r>
+            <a:r>
+              <a:rPr lang="de-DE" dirty="0" err="1"/>
+              <a:t>needs</a:t>
+            </a:r>
+            <a:endParaRPr lang="de-DE" dirty="0"/>
+          </a:p>
+          <a:p>
+            <a:r>
+              <a:rPr lang="de-DE" dirty="0"/>
+              <a:t>Model </a:t>
+            </a:r>
+            <a:r>
+              <a:rPr lang="de-DE" dirty="0" err="1"/>
+              <a:t>once</a:t>
+            </a:r>
+            <a:r>
+              <a:rPr lang="de-DE" dirty="0"/>
+              <a:t> – Use different </a:t>
+            </a:r>
+            <a:r>
+              <a:rPr lang="de-DE" dirty="0" err="1"/>
+              <a:t>analysis</a:t>
+            </a:r>
+            <a:r>
+              <a:rPr lang="de-DE" dirty="0"/>
+              <a:t> </a:t>
+            </a:r>
+            <a:r>
+              <a:rPr lang="de-DE" dirty="0" err="1"/>
+              <a:t>methods</a:t>
+            </a:r>
+            <a:endParaRPr lang="de-DE" dirty="0"/>
+          </a:p>
+          <a:p>
+            <a:endParaRPr lang="de-DE" dirty="0"/>
           </a:p>
           <a:p>
             <a:endParaRPr lang="de-DE" dirty="0"/>
@@ -3125,10 +3666,124 @@
           <a:lstStyle/>
           <a:p>
             <a:r>
-              <a:rPr lang="de-DE" dirty="0" err="1"/>
-              <a:t>sdf</a:t>
+              <a:rPr lang="de-DE" dirty="0"/>
+              <a:t>Model </a:t>
+            </a:r>
+            <a:r>
+              <a:rPr lang="de-DE" dirty="0" err="1"/>
+              <a:t>arbitrary</a:t>
+            </a:r>
+            <a:r>
+              <a:rPr lang="de-DE" dirty="0"/>
+              <a:t> </a:t>
+            </a:r>
+            <a:r>
+              <a:rPr lang="de-DE" dirty="0" err="1"/>
+              <a:t>optical</a:t>
+            </a:r>
+            <a:r>
+              <a:rPr lang="de-DE" dirty="0"/>
+              <a:t> </a:t>
+            </a:r>
+            <a:r>
+              <a:rPr lang="de-DE" dirty="0" err="1"/>
+              <a:t>system</a:t>
+            </a:r>
+            <a:r>
+              <a:rPr lang="de-DE" dirty="0"/>
+              <a:t> </a:t>
+            </a:r>
+            <a:r>
+              <a:rPr lang="de-DE" dirty="0" err="1"/>
+              <a:t>as</a:t>
+            </a:r>
+            <a:r>
+              <a:rPr lang="de-DE" dirty="0"/>
+              <a:t> </a:t>
+            </a:r>
+            <a:r>
+              <a:rPr lang="de-DE" dirty="0" err="1"/>
+              <a:t>acyclic</a:t>
+            </a:r>
+            <a:r>
+              <a:rPr lang="de-DE" dirty="0"/>
+              <a:t> </a:t>
+            </a:r>
+            <a:r>
+              <a:rPr lang="de-DE" dirty="0" err="1"/>
+              <a:t>directed</a:t>
+            </a:r>
+            <a:r>
+              <a:rPr lang="de-DE" dirty="0"/>
+              <a:t> </a:t>
+            </a:r>
+            <a:r>
+              <a:rPr lang="de-DE" dirty="0" err="1"/>
+              <a:t>graphs</a:t>
             </a:r>
             <a:endParaRPr lang="de-DE" dirty="0"/>
+          </a:p>
+          <a:p>
+            <a:r>
+              <a:rPr lang="de-DE" dirty="0"/>
+              <a:t>Software </a:t>
+            </a:r>
+            <a:r>
+              <a:rPr lang="de-DE" dirty="0" err="1"/>
+              <a:t>written</a:t>
+            </a:r>
+            <a:r>
+              <a:rPr lang="de-DE" dirty="0"/>
+              <a:t> in Rust (</a:t>
+            </a:r>
+            <a:r>
+              <a:rPr lang="de-DE" dirty="0" err="1"/>
+              <a:t>safety</a:t>
+            </a:r>
+            <a:r>
+              <a:rPr lang="de-DE" dirty="0"/>
+              <a:t>, modern, </a:t>
+            </a:r>
+            <a:r>
+              <a:rPr lang="de-DE" dirty="0" err="1"/>
+              <a:t>speed</a:t>
+            </a:r>
+            <a:r>
+              <a:rPr lang="de-DE" dirty="0"/>
+              <a:t>, </a:t>
+            </a:r>
+            <a:r>
+              <a:rPr lang="de-DE" dirty="0" err="1"/>
+              <a:t>memory</a:t>
+            </a:r>
+            <a:r>
+              <a:rPr lang="de-DE" dirty="0"/>
+              <a:t> </a:t>
+            </a:r>
+            <a:r>
+              <a:rPr lang="de-DE" dirty="0" err="1"/>
+              <a:t>efficient</a:t>
+            </a:r>
+            <a:r>
+              <a:rPr lang="de-DE" dirty="0"/>
+              <a:t>, </a:t>
+            </a:r>
+            <a:r>
+              <a:rPr lang="de-DE" dirty="0" err="1"/>
+              <a:t>inclusion</a:t>
+            </a:r>
+            <a:r>
+              <a:rPr lang="de-DE" dirty="0"/>
+              <a:t> </a:t>
+            </a:r>
+            <a:r>
+              <a:rPr lang="de-DE" dirty="0" err="1"/>
+              <a:t>of</a:t>
+            </a:r>
+            <a:r>
+              <a:rPr lang="de-DE" dirty="0"/>
+              <a:t> external code…)</a:t>
+            </a:r>
           </a:p>
           <a:p>
             <a:endParaRPr lang="de-DE" dirty="0"/>
@@ -4154,7 +4809,7 @@
           <p:cNvPr id="2" name="Titel 1">
             <a:extLst>
               <a:ext uri="{FF2B5EF4-FFF2-40B4-BE49-F238E27FC236}">
-                <a16:creationId xmlns:a16="http://schemas.microsoft.com/office/drawing/2014/main" id="{CD503747-5C14-46FE-93EE-221C93D1737E}"/>
+                <a16:creationId xmlns:a16="http://schemas.microsoft.com/office/drawing/2014/main" id="{771A6D0C-D6FE-4F95-9CB3-A4591AB30B7E}"/>
               </a:ext>
             </a:extLst>
           </p:cNvPr>
@@ -4172,11 +4827,11 @@
           <a:p>
             <a:r>
               <a:rPr lang="de-DE" dirty="0"/>
-              <a:t>OPOSSUM </a:t>
-            </a:r>
-            <a:r>
-              <a:rPr lang="de-DE" dirty="0" err="1"/>
-              <a:t>ecosystem</a:t>
+              <a:t>Project </a:t>
+            </a:r>
+            <a:r>
+              <a:rPr lang="de-DE" dirty="0" err="1"/>
+              <a:t>status</a:t>
             </a:r>
             <a:endParaRPr lang="de-DE" dirty="0"/>
           </a:p>
@@ -4187,7 +4842,7 @@
           <p:cNvPr id="3" name="Inhaltsplatzhalter 2">
             <a:extLst>
               <a:ext uri="{FF2B5EF4-FFF2-40B4-BE49-F238E27FC236}">
-                <a16:creationId xmlns:a16="http://schemas.microsoft.com/office/drawing/2014/main" id="{7B929AA6-BB27-4CD5-BE91-C5B21D3BCEF2}"/>
+                <a16:creationId xmlns:a16="http://schemas.microsoft.com/office/drawing/2014/main" id="{89DF750B-6CEA-4320-8D3A-E04D835AA123}"/>
               </a:ext>
             </a:extLst>
           </p:cNvPr>
@@ -4198,26 +4853,285 @@
             <p:ph idx="1"/>
           </p:nvPr>
         </p:nvSpPr>
-        <p:spPr/>
+        <p:spPr>
+          <a:xfrm>
+            <a:off x="137159" y="973714"/>
+            <a:ext cx="4977499" cy="3875012"/>
+          </a:xfrm>
+        </p:spPr>
         <p:txBody>
           <a:bodyPr/>
           <a:lstStyle/>
           <a:p>
             <a:r>
-              <a:rPr lang="de-DE" dirty="0" err="1"/>
-              <a:t>MaterialDB</a:t>
-            </a:r>
-            <a:endParaRPr lang="de-DE"/>
-          </a:p>
-          <a:p>
-            <a:endParaRPr lang="de-DE"/>
+              <a:rPr lang="de-DE" dirty="0"/>
+              <a:t>Project plan</a:t>
+            </a:r>
+          </a:p>
+          <a:p>
+            <a:r>
+              <a:rPr lang="de-DE" dirty="0"/>
+              <a:t>Optical </a:t>
+            </a:r>
+            <a:r>
+              <a:rPr lang="de-DE" dirty="0" err="1"/>
+              <a:t>model</a:t>
+            </a:r>
+            <a:r>
+              <a:rPr lang="de-DE" dirty="0"/>
+              <a:t> </a:t>
+            </a:r>
+            <a:r>
+              <a:rPr lang="de-DE" dirty="0" err="1"/>
+              <a:t>concept</a:t>
+            </a:r>
+            <a:r>
+              <a:rPr lang="de-DE" dirty="0"/>
+              <a:t> </a:t>
+            </a:r>
+            <a:r>
+              <a:rPr lang="de-DE" dirty="0" err="1"/>
+              <a:t>worked</a:t>
+            </a:r>
+            <a:r>
+              <a:rPr lang="de-DE" dirty="0"/>
+              <a:t> out</a:t>
+            </a:r>
+          </a:p>
+          <a:p>
+            <a:r>
+              <a:rPr lang="de-DE" dirty="0"/>
+              <a:t>OPOSSUM v0.2.0</a:t>
+            </a:r>
+          </a:p>
+          <a:p>
+            <a:pPr lvl="1"/>
+            <a:r>
+              <a:rPr lang="de-DE" dirty="0" err="1"/>
+              <a:t>technical</a:t>
+            </a:r>
+            <a:r>
+              <a:rPr lang="de-DE" dirty="0"/>
+              <a:t> </a:t>
+            </a:r>
+            <a:r>
+              <a:rPr lang="de-DE" dirty="0" err="1"/>
+              <a:t>concept</a:t>
+            </a:r>
+            <a:r>
+              <a:rPr lang="de-DE" dirty="0"/>
+              <a:t> </a:t>
+            </a:r>
+            <a:r>
+              <a:rPr lang="de-DE" dirty="0" err="1"/>
+              <a:t>preview</a:t>
+            </a:r>
+            <a:r>
+              <a:rPr lang="de-DE" dirty="0"/>
+              <a:t> (&gt; 6000 </a:t>
+            </a:r>
+            <a:r>
+              <a:rPr lang="de-DE" dirty="0" err="1"/>
+              <a:t>lines</a:t>
+            </a:r>
+            <a:r>
+              <a:rPr lang="de-DE" dirty="0"/>
+              <a:t> </a:t>
+            </a:r>
+            <a:r>
+              <a:rPr lang="de-DE" dirty="0" err="1"/>
+              <a:t>of</a:t>
+            </a:r>
+            <a:r>
+              <a:rPr lang="de-DE" dirty="0"/>
+              <a:t> code)</a:t>
+            </a:r>
+          </a:p>
+          <a:p>
+            <a:pPr lvl="1"/>
+            <a:r>
+              <a:rPr lang="de-DE" dirty="0" err="1"/>
+              <a:t>very</a:t>
+            </a:r>
+            <a:r>
+              <a:rPr lang="de-DE" dirty="0"/>
+              <a:t> </a:t>
+            </a:r>
+            <a:r>
+              <a:rPr lang="de-DE" dirty="0" err="1"/>
+              <a:t>basic</a:t>
+            </a:r>
+            <a:r>
+              <a:rPr lang="de-DE" dirty="0"/>
+              <a:t> </a:t>
+            </a:r>
+            <a:r>
+              <a:rPr lang="de-DE" dirty="0" err="1"/>
+              <a:t>command</a:t>
+            </a:r>
+            <a:r>
+              <a:rPr lang="de-DE" dirty="0"/>
+              <a:t> </a:t>
+            </a:r>
+            <a:r>
+              <a:rPr lang="de-DE" dirty="0" err="1"/>
+              <a:t>line</a:t>
+            </a:r>
+            <a:r>
+              <a:rPr lang="de-DE" dirty="0"/>
+              <a:t> interface (CLI)</a:t>
+            </a:r>
+          </a:p>
+          <a:p>
+            <a:pPr lvl="1"/>
+            <a:r>
+              <a:rPr lang="de-DE" dirty="0" err="1"/>
+              <a:t>implementation</a:t>
+            </a:r>
+            <a:r>
+              <a:rPr lang="de-DE" dirty="0"/>
+              <a:t> </a:t>
+            </a:r>
+            <a:r>
+              <a:rPr lang="de-DE" dirty="0" err="1"/>
+              <a:t>of</a:t>
+            </a:r>
+            <a:r>
+              <a:rPr lang="de-DE" dirty="0"/>
+              <a:t> </a:t>
+            </a:r>
+            <a:r>
+              <a:rPr lang="de-DE" dirty="0" err="1"/>
+              <a:t>first</a:t>
+            </a:r>
+            <a:r>
+              <a:rPr lang="de-DE" dirty="0"/>
+              <a:t> simple </a:t>
+            </a:r>
+            <a:r>
+              <a:rPr lang="de-DE" dirty="0" err="1"/>
+              <a:t>nodes</a:t>
+            </a:r>
+            <a:r>
+              <a:rPr lang="de-DE" dirty="0"/>
+              <a:t> (source, </a:t>
+            </a:r>
+            <a:r>
+              <a:rPr lang="de-DE" dirty="0" err="1"/>
+              <a:t>detector</a:t>
+            </a:r>
+            <a:r>
+              <a:rPr lang="de-DE" dirty="0"/>
+              <a:t>, </a:t>
+            </a:r>
+            <a:r>
+              <a:rPr lang="de-DE" dirty="0" err="1"/>
+              <a:t>filter</a:t>
+            </a:r>
+            <a:r>
+              <a:rPr lang="de-DE" dirty="0"/>
+              <a:t>, beam </a:t>
+            </a:r>
+            <a:r>
+              <a:rPr lang="de-DE" dirty="0" err="1"/>
+              <a:t>splitter</a:t>
+            </a:r>
+            <a:r>
+              <a:rPr lang="de-DE" dirty="0"/>
+              <a:t>, etc..)</a:t>
+            </a:r>
+          </a:p>
+          <a:p>
+            <a:pPr lvl="1"/>
+            <a:r>
+              <a:rPr lang="de-DE" dirty="0" err="1"/>
+              <a:t>implementation</a:t>
+            </a:r>
+            <a:r>
+              <a:rPr lang="de-DE" dirty="0"/>
+              <a:t> </a:t>
+            </a:r>
+            <a:r>
+              <a:rPr lang="de-DE" dirty="0" err="1"/>
+              <a:t>of</a:t>
+            </a:r>
+            <a:r>
+              <a:rPr lang="de-DE" dirty="0"/>
+              <a:t> </a:t>
+            </a:r>
+            <a:r>
+              <a:rPr lang="de-DE" dirty="0" err="1"/>
+              <a:t>group</a:t>
+            </a:r>
+            <a:r>
+              <a:rPr lang="de-DE" dirty="0"/>
+              <a:t> &amp; </a:t>
+            </a:r>
+            <a:r>
+              <a:rPr lang="de-DE" dirty="0" err="1"/>
+              <a:t>reference</a:t>
+            </a:r>
+            <a:r>
+              <a:rPr lang="de-DE" dirty="0"/>
+              <a:t> </a:t>
+            </a:r>
+            <a:r>
+              <a:rPr lang="de-DE" dirty="0" err="1"/>
+              <a:t>nodes</a:t>
+            </a:r>
+            <a:endParaRPr lang="de-DE" dirty="0"/>
+          </a:p>
+          <a:p>
+            <a:pPr lvl="1"/>
+            <a:r>
+              <a:rPr lang="de-DE" dirty="0" err="1"/>
+              <a:t>energy</a:t>
+            </a:r>
+            <a:r>
+              <a:rPr lang="de-DE" dirty="0"/>
+              <a:t> </a:t>
+            </a:r>
+            <a:r>
+              <a:rPr lang="de-DE" dirty="0" err="1"/>
+              <a:t>analyzer</a:t>
+            </a:r>
+            <a:endParaRPr lang="de-DE" dirty="0"/>
           </a:p>
         </p:txBody>
       </p:sp>
+      <p:pic>
+        <p:nvPicPr>
+          <p:cNvPr id="6" name="Grafik 5">
+            <a:extLst>
+              <a:ext uri="{FF2B5EF4-FFF2-40B4-BE49-F238E27FC236}">
+                <a16:creationId xmlns:a16="http://schemas.microsoft.com/office/drawing/2014/main" id="{8318842A-4BAF-4BA9-AD9D-CAB17C9F5187}"/>
+              </a:ext>
+            </a:extLst>
+          </p:cNvPr>
+          <p:cNvPicPr>
+            <a:picLocks noChangeAspect="1"/>
+          </p:cNvPicPr>
+          <p:nvPr/>
+        </p:nvPicPr>
+        <p:blipFill rotWithShape="1">
+          <a:blip r:embed="rId2"/>
+          <a:srcRect l="1747" r="1649" b="795"/>
+          <a:stretch/>
+        </p:blipFill>
+        <p:spPr>
+          <a:xfrm>
+            <a:off x="5114658" y="980087"/>
+            <a:ext cx="3938533" cy="3447534"/>
+          </a:xfrm>
+          <a:prstGeom prst="rect">
+            <a:avLst/>
+          </a:prstGeom>
+        </p:spPr>
+      </p:pic>
     </p:spTree>
     <p:extLst>
       <p:ext uri="{BB962C8B-B14F-4D97-AF65-F5344CB8AC3E}">
-        <p14:creationId xmlns:p14="http://schemas.microsoft.com/office/powerpoint/2010/main" val="2818766969"/>
+        <p14:creationId xmlns:p14="http://schemas.microsoft.com/office/powerpoint/2010/main" val="2581685687"/>
       </p:ext>
     </p:extLst>
   </p:cSld>
@@ -4249,7 +5163,7 @@
           <p:cNvPr id="2" name="Titel 1">
             <a:extLst>
               <a:ext uri="{FF2B5EF4-FFF2-40B4-BE49-F238E27FC236}">
-                <a16:creationId xmlns:a16="http://schemas.microsoft.com/office/drawing/2014/main" id="{771A6D0C-D6FE-4F95-9CB3-A4591AB30B7E}"/>
+                <a16:creationId xmlns:a16="http://schemas.microsoft.com/office/drawing/2014/main" id="{CD503747-5C14-46FE-93EE-221C93D1737E}"/>
               </a:ext>
             </a:extLst>
           </p:cNvPr>
@@ -4267,11 +5181,11 @@
           <a:p>
             <a:r>
               <a:rPr lang="de-DE" dirty="0"/>
-              <a:t>Project </a:t>
-            </a:r>
-            <a:r>
-              <a:rPr lang="de-DE" dirty="0" err="1"/>
-              <a:t>status</a:t>
+              <a:t>OPOSSUM </a:t>
+            </a:r>
+            <a:r>
+              <a:rPr lang="de-DE" dirty="0" err="1"/>
+              <a:t>ecosystem</a:t>
             </a:r>
             <a:endParaRPr lang="de-DE" dirty="0"/>
           </a:p>
@@ -4282,7 +5196,7 @@
           <p:cNvPr id="3" name="Inhaltsplatzhalter 2">
             <a:extLst>
               <a:ext uri="{FF2B5EF4-FFF2-40B4-BE49-F238E27FC236}">
-                <a16:creationId xmlns:a16="http://schemas.microsoft.com/office/drawing/2014/main" id="{89DF750B-6CEA-4320-8D3A-E04D835AA123}"/>
+                <a16:creationId xmlns:a16="http://schemas.microsoft.com/office/drawing/2014/main" id="{7B929AA6-BB27-4CD5-BE91-C5B21D3BCEF2}"/>
               </a:ext>
             </a:extLst>
           </p:cNvPr>
@@ -4293,32 +5207,26 @@
             <p:ph idx="1"/>
           </p:nvPr>
         </p:nvSpPr>
-        <p:spPr/>
+        <p:spPr>
+          <a:xfrm>
+            <a:off x="317635" y="1215189"/>
+            <a:ext cx="4609297" cy="3550515"/>
+          </a:xfrm>
+        </p:spPr>
         <p:txBody>
           <a:bodyPr/>
           <a:lstStyle/>
           <a:p>
             <a:r>
               <a:rPr lang="de-DE" dirty="0"/>
-              <a:t>Project plan</a:t>
-            </a:r>
-          </a:p>
-          <a:p>
-            <a:r>
-              <a:rPr lang="de-DE" dirty="0"/>
-              <a:t>Optical </a:t>
-            </a:r>
-            <a:r>
-              <a:rPr lang="de-DE" dirty="0" err="1"/>
-              <a:t>model</a:t>
-            </a:r>
-            <a:r>
-              <a:rPr lang="de-DE" dirty="0"/>
               <a:t> </a:t>
             </a:r>
-            <a:r>
-              <a:rPr lang="de-DE" dirty="0" err="1"/>
-              <a:t>concept</a:t>
+          </a:p>
+          <a:p>
+            <a:pPr lvl="1"/>
+            <a:r>
+              <a:rPr lang="de-DE" dirty="0" err="1"/>
+              <a:t>database</a:t>
             </a:r>
             <a:r>
               <a:rPr lang="de-DE" dirty="0"/>
@@ -4326,24 +5234,39 @@
             </a:r>
             <a:r>
               <a:rPr lang="de-DE" dirty="0" err="1"/>
-              <a:t>worked</a:t>
-            </a:r>
-            <a:r>
-              <a:rPr lang="de-DE" dirty="0"/>
-              <a:t> out</a:t>
-            </a:r>
-          </a:p>
-          <a:p>
-            <a:r>
-              <a:rPr lang="de-DE" dirty="0"/>
-              <a:t>OPOSSUM v0.2.0</a:t>
-            </a:r>
+              <a:t>for</a:t>
+            </a:r>
+            <a:r>
+              <a:rPr lang="de-DE" dirty="0"/>
+              <a:t> </a:t>
+            </a:r>
+            <a:r>
+              <a:rPr lang="de-DE" dirty="0" err="1"/>
+              <a:t>arbitrary</a:t>
+            </a:r>
+            <a:r>
+              <a:rPr lang="de-DE" dirty="0"/>
+              <a:t> material </a:t>
+            </a:r>
+            <a:r>
+              <a:rPr lang="de-DE" dirty="0" err="1"/>
+              <a:t>parameters</a:t>
+            </a:r>
+            <a:endParaRPr lang="de-DE" dirty="0"/>
           </a:p>
           <a:p>
             <a:pPr lvl="1"/>
             <a:r>
               <a:rPr lang="de-DE" dirty="0" err="1"/>
-              <a:t>technical</a:t>
+              <a:t>db</a:t>
+            </a:r>
+            <a:r>
+              <a:rPr lang="de-DE" dirty="0"/>
+              <a:t> backend / web </a:t>
+            </a:r>
+            <a:r>
+              <a:rPr lang="de-DE" dirty="0" err="1"/>
+              <a:t>frontend</a:t>
             </a:r>
             <a:r>
               <a:rPr lang="de-DE" dirty="0"/>
@@ -4351,7 +5274,15 @@
             </a:r>
             <a:r>
               <a:rPr lang="de-DE" dirty="0" err="1"/>
-              <a:t>concept</a:t>
+              <a:t>architecture</a:t>
+            </a:r>
+            <a:endParaRPr lang="de-DE" dirty="0"/>
+          </a:p>
+          <a:p>
+            <a:pPr lvl="1"/>
+            <a:r>
+              <a:rPr lang="de-DE" dirty="0" err="1"/>
+              <a:t>first</a:t>
             </a:r>
             <a:r>
               <a:rPr lang="de-DE" dirty="0"/>
@@ -4361,17 +5292,36 @@
               <a:rPr lang="de-DE" dirty="0" err="1"/>
               <a:t>preview</a:t>
             </a:r>
+            <a:r>
+              <a:rPr lang="de-DE" dirty="0"/>
+              <a:t> </a:t>
+            </a:r>
+            <a:r>
+              <a:rPr lang="de-DE" dirty="0" err="1"/>
+              <a:t>version</a:t>
+            </a:r>
+            <a:r>
+              <a:rPr lang="de-DE" dirty="0"/>
+              <a:t> </a:t>
+            </a:r>
+            <a:r>
+              <a:rPr lang="de-DE" dirty="0" err="1"/>
+              <a:t>available</a:t>
+            </a:r>
             <a:endParaRPr lang="de-DE" dirty="0"/>
           </a:p>
           <a:p>
+            <a:r>
+              <a:rPr lang="de-DE" dirty="0" err="1"/>
+              <a:t>OpticDB</a:t>
+            </a:r>
+            <a:endParaRPr lang="de-DE" dirty="0"/>
+          </a:p>
+          <a:p>
             <a:pPr lvl="1"/>
             <a:r>
-              <a:rPr lang="de-DE" dirty="0"/>
-              <a:t>simple </a:t>
-            </a:r>
-            <a:r>
-              <a:rPr lang="de-DE" dirty="0" err="1"/>
-              <a:t>command</a:t>
+              <a:rPr lang="de-DE" dirty="0" err="1"/>
+              <a:t>database</a:t>
             </a:r>
             <a:r>
               <a:rPr lang="de-DE" dirty="0"/>
@@ -4379,18 +5329,65 @@
             </a:r>
             <a:r>
               <a:rPr lang="de-DE" dirty="0" err="1"/>
-              <a:t>line</a:t>
-            </a:r>
-            <a:r>
-              <a:rPr lang="de-DE" dirty="0"/>
-              <a:t> interface (CLI)</a:t>
-            </a:r>
+              <a:t>of</a:t>
+            </a:r>
+            <a:r>
+              <a:rPr lang="de-DE" dirty="0"/>
+              <a:t> </a:t>
+            </a:r>
+            <a:r>
+              <a:rPr lang="de-DE" dirty="0" err="1"/>
+              <a:t>standard</a:t>
+            </a:r>
+            <a:r>
+              <a:rPr lang="de-DE" dirty="0"/>
+              <a:t> </a:t>
+            </a:r>
+            <a:r>
+              <a:rPr lang="de-DE" dirty="0" err="1"/>
+              <a:t>optical</a:t>
+            </a:r>
+            <a:r>
+              <a:rPr lang="de-DE" dirty="0"/>
+              <a:t> </a:t>
+            </a:r>
+            <a:r>
+              <a:rPr lang="de-DE" dirty="0" err="1"/>
+              <a:t>elements</a:t>
+            </a:r>
+            <a:endParaRPr lang="de-DE" dirty="0"/>
           </a:p>
           <a:p>
             <a:pPr lvl="1"/>
             <a:r>
-              <a:rPr lang="de-DE" dirty="0" err="1"/>
-              <a:t>implementation</a:t>
+              <a:rPr lang="de-DE" dirty="0"/>
+              <a:t>in </a:t>
+            </a:r>
+            <a:r>
+              <a:rPr lang="de-DE" dirty="0" err="1"/>
+              <a:t>conception</a:t>
+            </a:r>
+            <a:r>
+              <a:rPr lang="de-DE" dirty="0"/>
+              <a:t> / </a:t>
+            </a:r>
+            <a:r>
+              <a:rPr lang="de-DE" dirty="0" err="1"/>
+              <a:t>planning</a:t>
+            </a:r>
+            <a:endParaRPr lang="de-DE" dirty="0"/>
+          </a:p>
+          <a:p>
+            <a:r>
+              <a:rPr lang="de-DE" dirty="0"/>
+              <a:t>OPOSSUM Reporter</a:t>
+            </a:r>
+          </a:p>
+          <a:p>
+            <a:pPr lvl="1"/>
+            <a:r>
+              <a:rPr lang="de-DE" dirty="0" err="1"/>
+              <a:t>generation</a:t>
             </a:r>
             <a:r>
               <a:rPr lang="de-DE" dirty="0"/>
@@ -4402,111 +5399,119 @@
             </a:r>
             <a:r>
               <a:rPr lang="de-DE" dirty="0"/>
+              <a:t> OPOSSUM </a:t>
+            </a:r>
+            <a:r>
+              <a:rPr lang="de-DE" dirty="0" err="1"/>
+              <a:t>analysis</a:t>
+            </a:r>
+            <a:r>
+              <a:rPr lang="de-DE" dirty="0"/>
               <a:t> </a:t>
             </a:r>
             <a:r>
               <a:rPr lang="de-DE" dirty="0" err="1"/>
-              <a:t>first</a:t>
-            </a:r>
-            <a:r>
-              <a:rPr lang="de-DE" dirty="0"/>
-              <a:t> simple </a:t>
-            </a:r>
-            <a:r>
-              <a:rPr lang="de-DE" dirty="0" err="1"/>
-              <a:t>nodes</a:t>
-            </a:r>
-            <a:r>
-              <a:rPr lang="de-DE" dirty="0"/>
-              <a:t> (source, </a:t>
-            </a:r>
-            <a:r>
-              <a:rPr lang="de-DE" dirty="0" err="1"/>
-              <a:t>detector</a:t>
-            </a:r>
-            <a:r>
-              <a:rPr lang="de-DE" dirty="0"/>
-              <a:t>, </a:t>
-            </a:r>
-            <a:r>
-              <a:rPr lang="de-DE" dirty="0" err="1"/>
-              <a:t>filter</a:t>
-            </a:r>
-            <a:r>
-              <a:rPr lang="de-DE" dirty="0"/>
-              <a:t>, beam </a:t>
-            </a:r>
-            <a:r>
-              <a:rPr lang="de-DE" dirty="0" err="1"/>
-              <a:t>splitter</a:t>
-            </a:r>
-            <a:r>
-              <a:rPr lang="de-DE" dirty="0"/>
-              <a:t>, etc..)</a:t>
-            </a:r>
+              <a:t>reports</a:t>
+            </a:r>
+            <a:endParaRPr lang="de-DE" dirty="0"/>
           </a:p>
           <a:p>
             <a:pPr lvl="1"/>
             <a:r>
-              <a:rPr lang="de-DE" dirty="0" err="1"/>
-              <a:t>implementation</a:t>
-            </a:r>
-            <a:r>
-              <a:rPr lang="de-DE" dirty="0"/>
-              <a:t> </a:t>
-            </a:r>
-            <a:r>
-              <a:rPr lang="de-DE" dirty="0" err="1"/>
-              <a:t>of</a:t>
-            </a:r>
-            <a:r>
-              <a:rPr lang="de-DE" dirty="0"/>
-              <a:t> </a:t>
-            </a:r>
-            <a:r>
-              <a:rPr lang="de-DE" dirty="0" err="1"/>
-              <a:t>group</a:t>
-            </a:r>
-            <a:r>
-              <a:rPr lang="de-DE" dirty="0"/>
-              <a:t> &amp; </a:t>
-            </a:r>
-            <a:r>
-              <a:rPr lang="de-DE" dirty="0" err="1"/>
-              <a:t>reference</a:t>
-            </a:r>
-            <a:r>
-              <a:rPr lang="de-DE" dirty="0"/>
-              <a:t> </a:t>
-            </a:r>
-            <a:r>
-              <a:rPr lang="de-DE" dirty="0" err="1"/>
-              <a:t>nodes</a:t>
+              <a:rPr lang="de-DE" dirty="0"/>
+              <a:t>in </a:t>
+            </a:r>
+            <a:r>
+              <a:rPr lang="de-DE" dirty="0" err="1"/>
+              <a:t>conception</a:t>
+            </a:r>
+            <a:r>
+              <a:rPr lang="de-DE" dirty="0"/>
+              <a:t> / </a:t>
+            </a:r>
+            <a:r>
+              <a:rPr lang="de-DE" dirty="0" err="1"/>
+              <a:t>planning</a:t>
             </a:r>
             <a:endParaRPr lang="de-DE" dirty="0"/>
           </a:p>
           <a:p>
-            <a:pPr lvl="1"/>
-            <a:r>
-              <a:rPr lang="de-DE" dirty="0" err="1"/>
-              <a:t>energy</a:t>
-            </a:r>
-            <a:r>
-              <a:rPr lang="de-DE" dirty="0"/>
-              <a:t> </a:t>
-            </a:r>
-            <a:r>
-              <a:rPr lang="de-DE" dirty="0" err="1"/>
-              <a:t>analyzer</a:t>
-            </a:r>
+            <a:endParaRPr lang="de-DE" dirty="0"/>
+          </a:p>
+          <a:p>
             <a:endParaRPr lang="de-DE" dirty="0"/>
           </a:p>
         </p:txBody>
       </p:sp>
+      <p:pic>
+        <p:nvPicPr>
+          <p:cNvPr id="5" name="Grafik 4">
+            <a:extLst>
+              <a:ext uri="{FF2B5EF4-FFF2-40B4-BE49-F238E27FC236}">
+                <a16:creationId xmlns:a16="http://schemas.microsoft.com/office/drawing/2014/main" id="{DDA796A3-7668-4FB0-99A7-A6EFD550B5C7}"/>
+              </a:ext>
+            </a:extLst>
+          </p:cNvPr>
+          <p:cNvPicPr>
+            <a:picLocks noChangeAspect="1"/>
+          </p:cNvPicPr>
+          <p:nvPr/>
+        </p:nvPicPr>
+        <p:blipFill>
+          <a:blip r:embed="rId2">
+            <a:extLst>
+              <a:ext uri="{96DAC541-7B7A-43D3-8B79-37D633B846F1}">
+                <asvg:svgBlip xmlns:asvg="http://schemas.microsoft.com/office/drawing/2016/SVG/main" r:embed="rId3"/>
+              </a:ext>
+            </a:extLst>
+          </a:blip>
+          <a:stretch>
+            <a:fillRect/>
+          </a:stretch>
+        </p:blipFill>
+        <p:spPr>
+          <a:xfrm>
+            <a:off x="676773" y="1068082"/>
+            <a:ext cx="1579145" cy="526382"/>
+          </a:xfrm>
+          <a:prstGeom prst="rect">
+            <a:avLst/>
+          </a:prstGeom>
+        </p:spPr>
+      </p:pic>
+      <p:pic>
+        <p:nvPicPr>
+          <p:cNvPr id="7" name="Grafik 6">
+            <a:extLst>
+              <a:ext uri="{FF2B5EF4-FFF2-40B4-BE49-F238E27FC236}">
+                <a16:creationId xmlns:a16="http://schemas.microsoft.com/office/drawing/2014/main" id="{79F99E7F-2C47-4B10-8852-6831034EBB7D}"/>
+              </a:ext>
+            </a:extLst>
+          </p:cNvPr>
+          <p:cNvPicPr>
+            <a:picLocks noChangeAspect="1"/>
+          </p:cNvPicPr>
+          <p:nvPr/>
+        </p:nvPicPr>
+        <p:blipFill rotWithShape="1">
+          <a:blip r:embed="rId4"/>
+          <a:srcRect l="16459" r="14991" b="8001"/>
+          <a:stretch/>
+        </p:blipFill>
+        <p:spPr>
+          <a:xfrm>
+            <a:off x="4899279" y="1068081"/>
+            <a:ext cx="4004089" cy="3590259"/>
+          </a:xfrm>
+          <a:prstGeom prst="rect">
+            <a:avLst/>
+          </a:prstGeom>
+        </p:spPr>
+      </p:pic>
     </p:spTree>
     <p:extLst>
       <p:ext uri="{BB962C8B-B14F-4D97-AF65-F5344CB8AC3E}">
-        <p14:creationId xmlns:p14="http://schemas.microsoft.com/office/powerpoint/2010/main" val="2581685687"/>
+        <p14:creationId xmlns:p14="http://schemas.microsoft.com/office/powerpoint/2010/main" val="2818766969"/>
       </p:ext>
     </p:extLst>
   </p:cSld>
@@ -4727,6 +5732,42 @@
           </a:p>
         </p:txBody>
       </p:sp>
+      <p:pic>
+        <p:nvPicPr>
+          <p:cNvPr id="4" name="Grafik 3">
+            <a:extLst>
+              <a:ext uri="{FF2B5EF4-FFF2-40B4-BE49-F238E27FC236}">
+                <a16:creationId xmlns:a16="http://schemas.microsoft.com/office/drawing/2014/main" id="{C6595470-9348-41C7-A073-677AC1627BC1}"/>
+              </a:ext>
+            </a:extLst>
+          </p:cNvPr>
+          <p:cNvPicPr>
+            <a:picLocks noChangeAspect="1"/>
+          </p:cNvPicPr>
+          <p:nvPr/>
+        </p:nvPicPr>
+        <p:blipFill>
+          <a:blip r:embed="rId2">
+            <a:extLst>
+              <a:ext uri="{96DAC541-7B7A-43D3-8B79-37D633B846F1}">
+                <asvg:svgBlip xmlns:asvg="http://schemas.microsoft.com/office/drawing/2016/SVG/main" r:embed="rId3"/>
+              </a:ext>
+            </a:extLst>
+          </a:blip>
+          <a:stretch>
+            <a:fillRect/>
+          </a:stretch>
+        </p:blipFill>
+        <p:spPr>
+          <a:xfrm>
+            <a:off x="2286001" y="2975414"/>
+            <a:ext cx="1433236" cy="1433236"/>
+          </a:xfrm>
+          <a:prstGeom prst="rect">
+            <a:avLst/>
+          </a:prstGeom>
+        </p:spPr>
+      </p:pic>
     </p:spTree>
     <p:extLst>
       <p:ext uri="{BB962C8B-B14F-4D97-AF65-F5344CB8AC3E}">

</xml_diff>

<commit_message>
Resolve "thrill GA talk"
</commit_message>
<xml_diff>
--- a/book/OPOSSUM THRILL Workshop 2023.pptx
+++ b/book/OPOSSUM THRILL Workshop 2023.pptx
@@ -5,21 +5,23 @@
     <p:sldMasterId id="2147483648" r:id="rId1"/>
   </p:sldMasterIdLst>
   <p:notesMasterIdLst>
-    <p:notesMasterId r:id="rId11"/>
+    <p:notesMasterId r:id="rId13"/>
   </p:notesMasterIdLst>
   <p:handoutMasterIdLst>
-    <p:handoutMasterId r:id="rId12"/>
+    <p:handoutMasterId r:id="rId14"/>
   </p:handoutMasterIdLst>
   <p:sldIdLst>
     <p:sldId id="256" r:id="rId2"/>
     <p:sldId id="257" r:id="rId3"/>
     <p:sldId id="259" r:id="rId4"/>
-    <p:sldId id="258" r:id="rId5"/>
-    <p:sldId id="260" r:id="rId6"/>
+    <p:sldId id="265" r:id="rId5"/>
+    <p:sldId id="258" r:id="rId6"/>
     <p:sldId id="261" r:id="rId7"/>
-    <p:sldId id="262" r:id="rId8"/>
-    <p:sldId id="264" r:id="rId9"/>
-    <p:sldId id="263" r:id="rId10"/>
+    <p:sldId id="266" r:id="rId8"/>
+    <p:sldId id="262" r:id="rId9"/>
+    <p:sldId id="264" r:id="rId10"/>
+    <p:sldId id="263" r:id="rId11"/>
+    <p:sldId id="260" r:id="rId12"/>
   </p:sldIdLst>
   <p:sldSz cx="9144000" cy="5143500" type="screen16x9"/>
   <p:notesSz cx="6858000" cy="9144000"/>
@@ -219,7 +221,7 @@
           <a:p>
             <a:fld id="{0B851660-0934-124D-A4B3-496C7F320307}" type="datetimeFigureOut">
               <a:rPr lang="de-DE" smtClean="0"/>
-              <a:t>19.10.2023</a:t>
+              <a:t>23.10.2023</a:t>
             </a:fld>
             <a:endParaRPr lang="de-DE"/>
           </a:p>
@@ -385,7 +387,7 @@
           <a:p>
             <a:fld id="{98C828EF-C252-394A-93BF-1C478CFA0896}" type="datetimeFigureOut">
               <a:rPr lang="de-DE" smtClean="0"/>
-              <a:t>19.10.2023</a:t>
+              <a:t>23.10.2023</a:t>
             </a:fld>
             <a:endParaRPr lang="de-DE"/>
           </a:p>
@@ -2554,6 +2556,879 @@
 </p:sld>
 </file>
 
+<file path=ppt/slides/slide10.xml><?xml version="1.0" encoding="utf-8"?>
+<p:sld xmlns:a="http://schemas.openxmlformats.org/drawingml/2006/main" xmlns:r="http://schemas.openxmlformats.org/officeDocument/2006/relationships" xmlns:p="http://schemas.openxmlformats.org/presentationml/2006/main">
+  <p:cSld>
+    <p:spTree>
+      <p:nvGrpSpPr>
+        <p:cNvPr id="1" name=""/>
+        <p:cNvGrpSpPr/>
+        <p:nvPr/>
+      </p:nvGrpSpPr>
+      <p:grpSpPr>
+        <a:xfrm>
+          <a:off x="0" y="0"/>
+          <a:ext cx="0" cy="0"/>
+          <a:chOff x="0" y="0"/>
+          <a:chExt cx="0" cy="0"/>
+        </a:xfrm>
+      </p:grpSpPr>
+      <p:sp>
+        <p:nvSpPr>
+          <p:cNvPr id="2" name="Titel 1">
+            <a:extLst>
+              <a:ext uri="{FF2B5EF4-FFF2-40B4-BE49-F238E27FC236}">
+                <a16:creationId xmlns:a16="http://schemas.microsoft.com/office/drawing/2014/main" id="{AADACEB8-D172-4E49-B819-AE4A0A0F2CA2}"/>
+              </a:ext>
+            </a:extLst>
+          </p:cNvPr>
+          <p:cNvSpPr>
+            <a:spLocks noGrp="1"/>
+          </p:cNvSpPr>
+          <p:nvPr>
+            <p:ph type="title"/>
+          </p:nvPr>
+        </p:nvSpPr>
+        <p:spPr/>
+        <p:txBody>
+          <a:bodyPr/>
+          <a:lstStyle/>
+          <a:p>
+            <a:r>
+              <a:rPr lang="de-DE" dirty="0"/>
+              <a:t>Outlook</a:t>
+            </a:r>
+          </a:p>
+        </p:txBody>
+      </p:sp>
+      <p:sp>
+        <p:nvSpPr>
+          <p:cNvPr id="3" name="Inhaltsplatzhalter 2">
+            <a:extLst>
+              <a:ext uri="{FF2B5EF4-FFF2-40B4-BE49-F238E27FC236}">
+                <a16:creationId xmlns:a16="http://schemas.microsoft.com/office/drawing/2014/main" id="{7AF4AFA8-D129-4BB0-9DA8-97D9440E97BF}"/>
+              </a:ext>
+            </a:extLst>
+          </p:cNvPr>
+          <p:cNvSpPr>
+            <a:spLocks noGrp="1"/>
+          </p:cNvSpPr>
+          <p:nvPr>
+            <p:ph idx="1"/>
+          </p:nvPr>
+        </p:nvSpPr>
+        <p:spPr/>
+        <p:txBody>
+          <a:bodyPr/>
+          <a:lstStyle/>
+          <a:p>
+            <a:r>
+              <a:rPr lang="de-DE" dirty="0" err="1"/>
+              <a:t>planned</a:t>
+            </a:r>
+            <a:r>
+              <a:rPr lang="de-DE" dirty="0"/>
+              <a:t> </a:t>
+            </a:r>
+            <a:r>
+              <a:rPr lang="de-DE" dirty="0" err="1"/>
+              <a:t>milestones</a:t>
+            </a:r>
+            <a:r>
+              <a:rPr lang="de-DE" dirty="0"/>
+              <a:t>:</a:t>
+            </a:r>
+          </a:p>
+          <a:p>
+            <a:pPr lvl="1"/>
+            <a:r>
+              <a:rPr lang="de-DE" dirty="0"/>
+              <a:t>v0.3: </a:t>
+            </a:r>
+            <a:r>
+              <a:rPr lang="de-DE" dirty="0" err="1"/>
+              <a:t>implementation</a:t>
+            </a:r>
+            <a:r>
+              <a:rPr lang="de-DE" dirty="0"/>
+              <a:t> </a:t>
+            </a:r>
+            <a:r>
+              <a:rPr lang="de-DE" dirty="0" err="1"/>
+              <a:t>of</a:t>
+            </a:r>
+            <a:r>
+              <a:rPr lang="de-DE" dirty="0"/>
+              <a:t> </a:t>
+            </a:r>
+            <a:r>
+              <a:rPr lang="de-DE" dirty="0" err="1"/>
+              <a:t>basic</a:t>
+            </a:r>
+            <a:r>
+              <a:rPr lang="de-DE" dirty="0"/>
+              <a:t> </a:t>
+            </a:r>
+            <a:r>
+              <a:rPr lang="de-DE" dirty="0" err="1"/>
+              <a:t>ray</a:t>
+            </a:r>
+            <a:r>
+              <a:rPr lang="de-DE" dirty="0"/>
+              <a:t> </a:t>
+            </a:r>
+            <a:r>
+              <a:rPr lang="de-DE" dirty="0" err="1"/>
+              <a:t>tracing</a:t>
+            </a:r>
+            <a:r>
+              <a:rPr lang="de-DE" dirty="0"/>
+              <a:t> (</a:t>
+            </a:r>
+            <a:r>
+              <a:rPr lang="de-DE" dirty="0" err="1"/>
+              <a:t>wavelength</a:t>
+            </a:r>
+            <a:r>
+              <a:rPr lang="de-DE" dirty="0"/>
+              <a:t> and </a:t>
+            </a:r>
+            <a:r>
+              <a:rPr lang="de-DE" dirty="0" err="1"/>
+              <a:t>polarization</a:t>
+            </a:r>
+            <a:r>
+              <a:rPr lang="de-DE" dirty="0"/>
+              <a:t> </a:t>
+            </a:r>
+            <a:r>
+              <a:rPr lang="de-DE" dirty="0" err="1"/>
+              <a:t>dependent</a:t>
+            </a:r>
+            <a:r>
+              <a:rPr lang="de-DE" dirty="0"/>
+              <a:t>)</a:t>
+            </a:r>
+          </a:p>
+          <a:p>
+            <a:pPr lvl="1"/>
+            <a:r>
+              <a:rPr lang="de-DE" dirty="0"/>
+              <a:t>v0.4: </a:t>
+            </a:r>
+            <a:r>
+              <a:rPr lang="de-DE" dirty="0" err="1"/>
+              <a:t>inclusion</a:t>
+            </a:r>
+            <a:r>
+              <a:rPr lang="de-DE" dirty="0"/>
+              <a:t> </a:t>
+            </a:r>
+            <a:r>
+              <a:rPr lang="de-DE" dirty="0" err="1"/>
+              <a:t>of</a:t>
+            </a:r>
+            <a:r>
+              <a:rPr lang="de-DE" dirty="0"/>
+              <a:t> </a:t>
+            </a:r>
+            <a:r>
+              <a:rPr lang="de-DE" dirty="0" err="1"/>
+              <a:t>first</a:t>
+            </a:r>
+            <a:r>
+              <a:rPr lang="de-DE" dirty="0"/>
+              <a:t> external code (Python </a:t>
+            </a:r>
+            <a:r>
+              <a:rPr lang="de-DE" dirty="0" err="1"/>
+              <a:t>module</a:t>
+            </a:r>
+            <a:r>
+              <a:rPr lang="de-DE" dirty="0"/>
+              <a:t>: SHG </a:t>
+            </a:r>
+            <a:r>
+              <a:rPr lang="de-DE" dirty="0" err="1"/>
+              <a:t>simulation</a:t>
+            </a:r>
+            <a:r>
+              <a:rPr lang="de-DE" dirty="0"/>
+              <a:t> </a:t>
+            </a:r>
+            <a:r>
+              <a:rPr lang="de-DE" dirty="0" err="1"/>
+              <a:t>by</a:t>
+            </a:r>
+            <a:r>
+              <a:rPr lang="de-DE" dirty="0"/>
+              <a:t> M. Malki)</a:t>
+            </a:r>
+          </a:p>
+          <a:p>
+            <a:pPr lvl="1"/>
+            <a:r>
+              <a:rPr lang="de-DE" dirty="0"/>
+              <a:t>v0.5: </a:t>
+            </a:r>
+            <a:r>
+              <a:rPr lang="de-DE" dirty="0" err="1"/>
+              <a:t>connection</a:t>
+            </a:r>
+            <a:r>
+              <a:rPr lang="de-DE" dirty="0"/>
+              <a:t> </a:t>
+            </a:r>
+            <a:r>
+              <a:rPr lang="de-DE" dirty="0" err="1"/>
+              <a:t>to</a:t>
+            </a:r>
+            <a:r>
+              <a:rPr lang="de-DE" dirty="0"/>
+              <a:t> </a:t>
+            </a:r>
+            <a:r>
+              <a:rPr lang="de-DE" dirty="0" err="1"/>
+              <a:t>Materialdb</a:t>
+            </a:r>
+            <a:r>
+              <a:rPr lang="de-DE" dirty="0"/>
+              <a:t>, ?</a:t>
+            </a:r>
+          </a:p>
+        </p:txBody>
+      </p:sp>
+      <p:pic>
+        <p:nvPicPr>
+          <p:cNvPr id="4" name="Grafik 3">
+            <a:extLst>
+              <a:ext uri="{FF2B5EF4-FFF2-40B4-BE49-F238E27FC236}">
+                <a16:creationId xmlns:a16="http://schemas.microsoft.com/office/drawing/2014/main" id="{C6595470-9348-41C7-A073-677AC1627BC1}"/>
+              </a:ext>
+            </a:extLst>
+          </p:cNvPr>
+          <p:cNvPicPr>
+            <a:picLocks noChangeAspect="1"/>
+          </p:cNvPicPr>
+          <p:nvPr/>
+        </p:nvPicPr>
+        <p:blipFill>
+          <a:blip r:embed="rId2">
+            <a:extLst>
+              <a:ext uri="{96DAC541-7B7A-43D3-8B79-37D633B846F1}">
+                <asvg:svgBlip xmlns:asvg="http://schemas.microsoft.com/office/drawing/2016/SVG/main" r:embed="rId3"/>
+              </a:ext>
+            </a:extLst>
+          </a:blip>
+          <a:stretch>
+            <a:fillRect/>
+          </a:stretch>
+        </p:blipFill>
+        <p:spPr>
+          <a:xfrm>
+            <a:off x="3564785" y="2571749"/>
+            <a:ext cx="1938373" cy="1938373"/>
+          </a:xfrm>
+          <a:prstGeom prst="rect">
+            <a:avLst/>
+          </a:prstGeom>
+        </p:spPr>
+      </p:pic>
+    </p:spTree>
+    <p:extLst>
+      <p:ext uri="{BB962C8B-B14F-4D97-AF65-F5344CB8AC3E}">
+        <p14:creationId xmlns:p14="http://schemas.microsoft.com/office/powerpoint/2010/main" val="1056657431"/>
+      </p:ext>
+    </p:extLst>
+  </p:cSld>
+  <p:clrMapOvr>
+    <a:masterClrMapping/>
+  </p:clrMapOvr>
+</p:sld>
+</file>
+
+<file path=ppt/slides/slide11.xml><?xml version="1.0" encoding="utf-8"?>
+<p:sld xmlns:a="http://schemas.openxmlformats.org/drawingml/2006/main" xmlns:r="http://schemas.openxmlformats.org/officeDocument/2006/relationships" xmlns:p="http://schemas.openxmlformats.org/presentationml/2006/main">
+  <p:cSld>
+    <p:spTree>
+      <p:nvGrpSpPr>
+        <p:cNvPr id="1" name=""/>
+        <p:cNvGrpSpPr/>
+        <p:nvPr/>
+      </p:nvGrpSpPr>
+      <p:grpSpPr>
+        <a:xfrm>
+          <a:off x="0" y="0"/>
+          <a:ext cx="0" cy="0"/>
+          <a:chOff x="0" y="0"/>
+          <a:chExt cx="0" cy="0"/>
+        </a:xfrm>
+      </p:grpSpPr>
+      <p:sp>
+        <p:nvSpPr>
+          <p:cNvPr id="2" name="Titel 1"/>
+          <p:cNvSpPr>
+            <a:spLocks noGrp="1"/>
+          </p:cNvSpPr>
+          <p:nvPr>
+            <p:ph type="title"/>
+          </p:nvPr>
+        </p:nvSpPr>
+        <p:spPr/>
+        <p:txBody>
+          <a:bodyPr/>
+          <a:lstStyle/>
+          <a:p>
+            <a:r>
+              <a:rPr lang="de-DE" dirty="0" err="1"/>
+              <a:t>Simulating</a:t>
+            </a:r>
+            <a:r>
+              <a:rPr lang="de-DE" dirty="0"/>
+              <a:t> double-pass </a:t>
+            </a:r>
+            <a:r>
+              <a:rPr lang="de-DE" dirty="0" err="1"/>
+              <a:t>systems</a:t>
+            </a:r>
+            <a:endParaRPr lang="en-US" dirty="0"/>
+          </a:p>
+        </p:txBody>
+      </p:sp>
+      <p:pic>
+        <p:nvPicPr>
+          <p:cNvPr id="7" name="Grafik 6"/>
+          <p:cNvPicPr>
+            <a:picLocks noChangeAspect="1"/>
+          </p:cNvPicPr>
+          <p:nvPr/>
+        </p:nvPicPr>
+        <p:blipFill>
+          <a:blip r:embed="rId2">
+            <a:extLst>
+              <a:ext uri="{28A0092B-C50C-407E-A947-70E740481C1C}">
+                <a14:useLocalDpi xmlns:a14="http://schemas.microsoft.com/office/drawing/2010/main" val="0"/>
+              </a:ext>
+            </a:extLst>
+          </a:blip>
+          <a:stretch>
+            <a:fillRect/>
+          </a:stretch>
+        </p:blipFill>
+        <p:spPr>
+          <a:xfrm>
+            <a:off x="230346" y="947873"/>
+            <a:ext cx="2666418" cy="847495"/>
+          </a:xfrm>
+          <a:prstGeom prst="rect">
+            <a:avLst/>
+          </a:prstGeom>
+        </p:spPr>
+      </p:pic>
+      <p:pic>
+        <p:nvPicPr>
+          <p:cNvPr id="6" name="Inhaltsplatzhalter 5"/>
+          <p:cNvPicPr>
+            <a:picLocks noGrp="1" noChangeAspect="1"/>
+          </p:cNvPicPr>
+          <p:nvPr>
+            <p:ph idx="1"/>
+          </p:nvPr>
+        </p:nvPicPr>
+        <p:blipFill>
+          <a:blip r:embed="rId3">
+            <a:extLst>
+              <a:ext uri="{28A0092B-C50C-407E-A947-70E740481C1C}">
+                <a14:useLocalDpi xmlns:a14="http://schemas.microsoft.com/office/drawing/2010/main" val="0"/>
+              </a:ext>
+            </a:extLst>
+          </a:blip>
+          <a:stretch>
+            <a:fillRect/>
+          </a:stretch>
+        </p:blipFill>
+        <p:spPr>
+          <a:xfrm>
+            <a:off x="229608" y="2052164"/>
+            <a:ext cx="1048492" cy="2659439"/>
+          </a:xfrm>
+        </p:spPr>
+      </p:pic>
+      <p:sp>
+        <p:nvSpPr>
+          <p:cNvPr id="8" name="Ellipse 7"/>
+          <p:cNvSpPr/>
+          <p:nvPr/>
+        </p:nvSpPr>
+        <p:spPr>
+          <a:xfrm>
+            <a:off x="286183" y="2589637"/>
+            <a:ext cx="670095" cy="432769"/>
+          </a:xfrm>
+          <a:prstGeom prst="ellipse">
+            <a:avLst/>
+          </a:prstGeom>
+          <a:solidFill>
+            <a:srgbClr val="FDBB63">
+              <a:alpha val="50196"/>
+            </a:srgbClr>
+          </a:solidFill>
+          <a:ln>
+            <a:noFill/>
+          </a:ln>
+          <a:effectLst/>
+        </p:spPr>
+        <p:style>
+          <a:lnRef idx="1">
+            <a:schemeClr val="accent1"/>
+          </a:lnRef>
+          <a:fillRef idx="3">
+            <a:schemeClr val="accent1"/>
+          </a:fillRef>
+          <a:effectRef idx="2">
+            <a:schemeClr val="accent1"/>
+          </a:effectRef>
+          <a:fontRef idx="minor">
+            <a:schemeClr val="lt1"/>
+          </a:fontRef>
+        </p:style>
+        <p:txBody>
+          <a:bodyPr rot="0" spcFirstLastPara="0" vertOverflow="overflow" horzOverflow="overflow" vert="horz" wrap="square" lIns="91440" tIns="45720" rIns="91440" bIns="45720" numCol="1" spcCol="0" rtlCol="0" fromWordArt="0" anchor="ctr" anchorCtr="0" forceAA="0" compatLnSpc="1">
+            <a:prstTxWarp prst="textNoShape">
+              <a:avLst/>
+            </a:prstTxWarp>
+            <a:noAutofit/>
+          </a:bodyPr>
+          <a:lstStyle/>
+          <a:p>
+            <a:pPr algn="ctr"/>
+            <a:endParaRPr lang="en-US"/>
+          </a:p>
+        </p:txBody>
+      </p:sp>
+      <p:cxnSp>
+        <p:nvCxnSpPr>
+          <p:cNvPr id="10" name="Gerade Verbindung mit Pfeil 9"/>
+          <p:cNvCxnSpPr/>
+          <p:nvPr/>
+        </p:nvCxnSpPr>
+        <p:spPr>
+          <a:xfrm flipH="1" flipV="1">
+            <a:off x="1088902" y="2806021"/>
+            <a:ext cx="467575" cy="160544"/>
+          </a:xfrm>
+          <a:prstGeom prst="straightConnector1">
+            <a:avLst/>
+          </a:prstGeom>
+          <a:ln>
+            <a:solidFill>
+              <a:schemeClr val="tx1"/>
+            </a:solidFill>
+            <a:tailEnd type="triangle"/>
+          </a:ln>
+          <a:effectLst/>
+        </p:spPr>
+        <p:style>
+          <a:lnRef idx="2">
+            <a:schemeClr val="accent1"/>
+          </a:lnRef>
+          <a:fillRef idx="0">
+            <a:schemeClr val="accent1"/>
+          </a:fillRef>
+          <a:effectRef idx="1">
+            <a:schemeClr val="accent1"/>
+          </a:effectRef>
+          <a:fontRef idx="minor">
+            <a:schemeClr val="tx1"/>
+          </a:fontRef>
+        </p:style>
+      </p:cxnSp>
+      <p:sp>
+        <p:nvSpPr>
+          <p:cNvPr id="12" name="Textfeld 11"/>
+          <p:cNvSpPr txBox="1"/>
+          <p:nvPr/>
+        </p:nvSpPr>
+        <p:spPr>
+          <a:xfrm>
+            <a:off x="1556477" y="2643399"/>
+            <a:ext cx="2159566" cy="646331"/>
+          </a:xfrm>
+          <a:prstGeom prst="rect">
+            <a:avLst/>
+          </a:prstGeom>
+        </p:spPr>
+        <p:txBody>
+          <a:bodyPr vert="horz" wrap="none" lIns="91440" tIns="45720" rIns="91440" bIns="45720" rtlCol="0" anchor="t">
+            <a:spAutoFit/>
+          </a:bodyPr>
+          <a:lstStyle/>
+          <a:p>
+            <a:pPr algn="l"/>
+            <a:r>
+              <a:rPr lang="de-DE" dirty="0" err="1">
+                <a:solidFill>
+                  <a:srgbClr val="FF0000"/>
+                </a:solidFill>
+              </a:rPr>
+              <a:t>Does</a:t>
+            </a:r>
+            <a:r>
+              <a:rPr lang="de-DE" dirty="0">
+                <a:solidFill>
+                  <a:srgbClr val="FF0000"/>
+                </a:solidFill>
+              </a:rPr>
+              <a:t> not </a:t>
+            </a:r>
+            <a:r>
+              <a:rPr lang="de-DE" dirty="0" err="1">
+                <a:solidFill>
+                  <a:srgbClr val="FF0000"/>
+                </a:solidFill>
+              </a:rPr>
+              <a:t>work</a:t>
+            </a:r>
+            <a:r>
+              <a:rPr lang="de-DE" dirty="0">
+                <a:solidFill>
+                  <a:srgbClr val="FF0000"/>
+                </a:solidFill>
+              </a:rPr>
+              <a:t>!</a:t>
+            </a:r>
+          </a:p>
+          <a:p>
+            <a:pPr algn="l"/>
+            <a:r>
+              <a:rPr lang="de-DE" dirty="0">
+                <a:solidFill>
+                  <a:srgbClr val="FF0000"/>
+                </a:solidFill>
+              </a:rPr>
+              <a:t>(</a:t>
+            </a:r>
+            <a:r>
+              <a:rPr lang="de-DE" dirty="0" err="1">
+                <a:solidFill>
+                  <a:srgbClr val="FF0000"/>
+                </a:solidFill>
+              </a:rPr>
+              <a:t>would</a:t>
+            </a:r>
+            <a:r>
+              <a:rPr lang="de-DE" dirty="0">
+                <a:solidFill>
+                  <a:srgbClr val="FF0000"/>
+                </a:solidFill>
+              </a:rPr>
+              <a:t> form a </a:t>
+            </a:r>
+            <a:r>
+              <a:rPr lang="de-DE" dirty="0" err="1">
+                <a:solidFill>
+                  <a:srgbClr val="FF0000"/>
+                </a:solidFill>
+              </a:rPr>
+              <a:t>loop</a:t>
+            </a:r>
+            <a:r>
+              <a:rPr lang="de-DE" dirty="0">
+                <a:solidFill>
+                  <a:srgbClr val="FF0000"/>
+                </a:solidFill>
+              </a:rPr>
+              <a:t>)</a:t>
+            </a:r>
+            <a:endParaRPr lang="en-US" dirty="0">
+              <a:solidFill>
+                <a:srgbClr val="FF0000"/>
+              </a:solidFill>
+            </a:endParaRPr>
+          </a:p>
+        </p:txBody>
+      </p:sp>
+      <p:sp>
+        <p:nvSpPr>
+          <p:cNvPr id="13" name="Textfeld 12"/>
+          <p:cNvSpPr txBox="1"/>
+          <p:nvPr/>
+        </p:nvSpPr>
+        <p:spPr>
+          <a:xfrm>
+            <a:off x="4220188" y="1075560"/>
+            <a:ext cx="3057247" cy="369332"/>
+          </a:xfrm>
+          <a:prstGeom prst="rect">
+            <a:avLst/>
+          </a:prstGeom>
+        </p:spPr>
+        <p:txBody>
+          <a:bodyPr vert="horz" wrap="none" lIns="91440" tIns="45720" rIns="91440" bIns="45720" rtlCol="0" anchor="t">
+            <a:spAutoFit/>
+          </a:bodyPr>
+          <a:lstStyle/>
+          <a:p>
+            <a:pPr algn="l"/>
+            <a:r>
+              <a:rPr lang="de-DE" dirty="0"/>
+              <a:t>Solution: „Reference </a:t>
+            </a:r>
+            <a:r>
+              <a:rPr lang="de-DE" dirty="0" err="1"/>
+              <a:t>nodes</a:t>
+            </a:r>
+            <a:r>
+              <a:rPr lang="de-DE" dirty="0"/>
+              <a:t>“</a:t>
+            </a:r>
+          </a:p>
+        </p:txBody>
+      </p:sp>
+      <p:pic>
+        <p:nvPicPr>
+          <p:cNvPr id="15" name="Grafik 14"/>
+          <p:cNvPicPr>
+            <a:picLocks noChangeAspect="1"/>
+          </p:cNvPicPr>
+          <p:nvPr/>
+        </p:nvPicPr>
+        <p:blipFill>
+          <a:blip r:embed="rId4">
+            <a:extLst>
+              <a:ext uri="{28A0092B-C50C-407E-A947-70E740481C1C}">
+                <a14:useLocalDpi xmlns:a14="http://schemas.microsoft.com/office/drawing/2010/main" val="0"/>
+              </a:ext>
+            </a:extLst>
+          </a:blip>
+          <a:stretch>
+            <a:fillRect/>
+          </a:stretch>
+        </p:blipFill>
+        <p:spPr>
+          <a:xfrm>
+            <a:off x="7658986" y="997642"/>
+            <a:ext cx="712921" cy="3777302"/>
+          </a:xfrm>
+          <a:prstGeom prst="rect">
+            <a:avLst/>
+          </a:prstGeom>
+        </p:spPr>
+      </p:pic>
+      <p:cxnSp>
+        <p:nvCxnSpPr>
+          <p:cNvPr id="17" name="Gerade Verbindung mit Pfeil 16"/>
+          <p:cNvCxnSpPr/>
+          <p:nvPr/>
+        </p:nvCxnSpPr>
+        <p:spPr>
+          <a:xfrm>
+            <a:off x="5814467" y="2966565"/>
+            <a:ext cx="1844519" cy="1403011"/>
+          </a:xfrm>
+          <a:prstGeom prst="straightConnector1">
+            <a:avLst/>
+          </a:prstGeom>
+          <a:ln>
+            <a:solidFill>
+              <a:schemeClr val="tx1"/>
+            </a:solidFill>
+            <a:tailEnd type="triangle"/>
+          </a:ln>
+          <a:effectLst/>
+        </p:spPr>
+        <p:style>
+          <a:lnRef idx="2">
+            <a:schemeClr val="accent1"/>
+          </a:lnRef>
+          <a:fillRef idx="0">
+            <a:schemeClr val="accent1"/>
+          </a:fillRef>
+          <a:effectRef idx="1">
+            <a:schemeClr val="accent1"/>
+          </a:effectRef>
+          <a:fontRef idx="minor">
+            <a:schemeClr val="tx1"/>
+          </a:fontRef>
+        </p:style>
+      </p:cxnSp>
+      <p:cxnSp>
+        <p:nvCxnSpPr>
+          <p:cNvPr id="19" name="Gerade Verbindung mit Pfeil 18"/>
+          <p:cNvCxnSpPr/>
+          <p:nvPr/>
+        </p:nvCxnSpPr>
+        <p:spPr>
+          <a:xfrm flipV="1">
+            <a:off x="5814467" y="1371620"/>
+            <a:ext cx="1898602" cy="1594944"/>
+          </a:xfrm>
+          <a:prstGeom prst="straightConnector1">
+            <a:avLst/>
+          </a:prstGeom>
+          <a:ln>
+            <a:solidFill>
+              <a:schemeClr val="tx1"/>
+            </a:solidFill>
+            <a:tailEnd type="triangle"/>
+          </a:ln>
+          <a:effectLst/>
+        </p:spPr>
+        <p:style>
+          <a:lnRef idx="2">
+            <a:schemeClr val="accent1"/>
+          </a:lnRef>
+          <a:fillRef idx="0">
+            <a:schemeClr val="accent1"/>
+          </a:fillRef>
+          <a:effectRef idx="1">
+            <a:schemeClr val="accent1"/>
+          </a:effectRef>
+          <a:fontRef idx="minor">
+            <a:schemeClr val="tx1"/>
+          </a:fontRef>
+        </p:style>
+      </p:cxnSp>
+      <p:cxnSp>
+        <p:nvCxnSpPr>
+          <p:cNvPr id="24" name="Gerade Verbindung mit Pfeil 23"/>
+          <p:cNvCxnSpPr/>
+          <p:nvPr/>
+        </p:nvCxnSpPr>
+        <p:spPr>
+          <a:xfrm flipV="1">
+            <a:off x="6545951" y="2052164"/>
+            <a:ext cx="1113035" cy="834129"/>
+          </a:xfrm>
+          <a:prstGeom prst="straightConnector1">
+            <a:avLst/>
+          </a:prstGeom>
+          <a:ln>
+            <a:solidFill>
+              <a:schemeClr val="tx1"/>
+            </a:solidFill>
+            <a:tailEnd type="triangle"/>
+          </a:ln>
+          <a:effectLst/>
+        </p:spPr>
+        <p:style>
+          <a:lnRef idx="2">
+            <a:schemeClr val="accent1"/>
+          </a:lnRef>
+          <a:fillRef idx="0">
+            <a:schemeClr val="accent1"/>
+          </a:fillRef>
+          <a:effectRef idx="1">
+            <a:schemeClr val="accent1"/>
+          </a:effectRef>
+          <a:fontRef idx="minor">
+            <a:schemeClr val="tx1"/>
+          </a:fontRef>
+        </p:style>
+      </p:cxnSp>
+      <p:cxnSp>
+        <p:nvCxnSpPr>
+          <p:cNvPr id="25" name="Gerade Verbindung mit Pfeil 24"/>
+          <p:cNvCxnSpPr/>
+          <p:nvPr/>
+        </p:nvCxnSpPr>
+        <p:spPr>
+          <a:xfrm>
+            <a:off x="6545951" y="2886293"/>
+            <a:ext cx="1111872" cy="759049"/>
+          </a:xfrm>
+          <a:prstGeom prst="straightConnector1">
+            <a:avLst/>
+          </a:prstGeom>
+          <a:ln>
+            <a:solidFill>
+              <a:schemeClr val="tx1"/>
+            </a:solidFill>
+            <a:tailEnd type="triangle"/>
+          </a:ln>
+          <a:effectLst/>
+        </p:spPr>
+        <p:style>
+          <a:lnRef idx="2">
+            <a:schemeClr val="accent1"/>
+          </a:lnRef>
+          <a:fillRef idx="0">
+            <a:schemeClr val="accent1"/>
+          </a:fillRef>
+          <a:effectRef idx="1">
+            <a:schemeClr val="accent1"/>
+          </a:effectRef>
+          <a:fontRef idx="minor">
+            <a:schemeClr val="tx1"/>
+          </a:fontRef>
+        </p:style>
+      </p:cxnSp>
+      <p:sp>
+        <p:nvSpPr>
+          <p:cNvPr id="29" name="Textfeld 28"/>
+          <p:cNvSpPr txBox="1"/>
+          <p:nvPr/>
+        </p:nvSpPr>
+        <p:spPr>
+          <a:xfrm>
+            <a:off x="4097594" y="2561197"/>
+            <a:ext cx="1787669" cy="646331"/>
+          </a:xfrm>
+          <a:prstGeom prst="rect">
+            <a:avLst/>
+          </a:prstGeom>
+        </p:spPr>
+        <p:txBody>
+          <a:bodyPr vert="horz" wrap="none" lIns="91440" tIns="45720" rIns="91440" bIns="45720" rtlCol="0" anchor="t">
+            <a:spAutoFit/>
+          </a:bodyPr>
+          <a:lstStyle/>
+          <a:p>
+            <a:pPr algn="l"/>
+            <a:r>
+              <a:rPr lang="de-DE" dirty="0" err="1"/>
+              <a:t>linked</a:t>
+            </a:r>
+            <a:r>
+              <a:rPr lang="de-DE" dirty="0"/>
+              <a:t> </a:t>
+            </a:r>
+            <a:r>
+              <a:rPr lang="de-DE" dirty="0" err="1"/>
+              <a:t>elements</a:t>
+            </a:r>
+            <a:endParaRPr lang="de-DE" dirty="0"/>
+          </a:p>
+          <a:p>
+            <a:pPr algn="l"/>
+            <a:r>
+              <a:rPr lang="de-DE" dirty="0"/>
+              <a:t>(</a:t>
+            </a:r>
+            <a:r>
+              <a:rPr lang="de-DE" dirty="0" err="1"/>
+              <a:t>inverted</a:t>
+            </a:r>
+            <a:r>
+              <a:rPr lang="de-DE" dirty="0"/>
+              <a:t>)</a:t>
+            </a:r>
+          </a:p>
+        </p:txBody>
+      </p:sp>
+    </p:spTree>
+    <p:extLst>
+      <p:ext uri="{BB962C8B-B14F-4D97-AF65-F5344CB8AC3E}">
+        <p14:creationId xmlns:p14="http://schemas.microsoft.com/office/powerpoint/2010/main" val="608887795"/>
+      </p:ext>
+    </p:extLst>
+  </p:cSld>
+  <p:clrMapOvr>
+    <a:masterClrMapping/>
+  </p:clrMapOvr>
+</p:sld>
+</file>
+
 <file path=ppt/slides/slide2.xml><?xml version="1.0" encoding="utf-8"?>
 <p:sld xmlns:a="http://schemas.openxmlformats.org/drawingml/2006/main" xmlns:r="http://schemas.openxmlformats.org/officeDocument/2006/relationships" xmlns:p="http://schemas.openxmlformats.org/presentationml/2006/main">
   <p:cSld>
@@ -3660,7 +4535,12 @@
             <p:ph idx="1"/>
           </p:nvPr>
         </p:nvSpPr>
-        <p:spPr/>
+        <p:spPr>
+          <a:xfrm>
+            <a:off x="317635" y="902389"/>
+            <a:ext cx="8420176" cy="1285661"/>
+          </a:xfrm>
+        </p:spPr>
         <p:txBody>
           <a:bodyPr/>
           <a:lstStyle/>
@@ -3724,29 +4604,174 @@
             <a:endParaRPr lang="de-DE" dirty="0"/>
           </a:p>
           <a:p>
-            <a:r>
-              <a:rPr lang="de-DE" dirty="0"/>
-              <a:t>Software </a:t>
-            </a:r>
-            <a:r>
-              <a:rPr lang="de-DE" dirty="0" err="1"/>
-              <a:t>written</a:t>
-            </a:r>
-            <a:r>
-              <a:rPr lang="de-DE" dirty="0"/>
-              <a:t> in Rust (</a:t>
-            </a:r>
-            <a:r>
-              <a:rPr lang="de-DE" dirty="0" err="1"/>
-              <a:t>safety</a:t>
-            </a:r>
-            <a:r>
-              <a:rPr lang="de-DE" dirty="0"/>
-              <a:t>, modern, </a:t>
-            </a:r>
-            <a:r>
-              <a:rPr lang="de-DE" dirty="0" err="1"/>
-              <a:t>speed</a:t>
+            <a:pPr lvl="1"/>
+            <a:r>
+              <a:rPr lang="de-DE" dirty="0"/>
+              <a:t>„light“ </a:t>
+            </a:r>
+            <a:r>
+              <a:rPr lang="de-DE" dirty="0" err="1"/>
+              <a:t>flowing</a:t>
+            </a:r>
+            <a:r>
+              <a:rPr lang="de-DE" dirty="0"/>
+              <a:t> </a:t>
+            </a:r>
+            <a:r>
+              <a:rPr lang="de-DE" dirty="0" err="1"/>
+              <a:t>as</a:t>
+            </a:r>
+            <a:r>
+              <a:rPr lang="de-DE" dirty="0"/>
+              <a:t> </a:t>
+            </a:r>
+            <a:r>
+              <a:rPr lang="de-DE" dirty="0" err="1"/>
+              <a:t>data</a:t>
+            </a:r>
+            <a:r>
+              <a:rPr lang="de-DE" dirty="0"/>
+              <a:t> </a:t>
+            </a:r>
+            <a:r>
+              <a:rPr lang="de-DE" dirty="0" err="1"/>
+              <a:t>between</a:t>
+            </a:r>
+            <a:r>
+              <a:rPr lang="de-DE" dirty="0"/>
+              <a:t> </a:t>
+            </a:r>
+            <a:r>
+              <a:rPr lang="de-DE" dirty="0" err="1"/>
+              <a:t>nodes</a:t>
+            </a:r>
+            <a:endParaRPr lang="de-DE" dirty="0"/>
+          </a:p>
+          <a:p>
+            <a:pPr lvl="1"/>
+            <a:r>
+              <a:rPr lang="de-DE" dirty="0" err="1"/>
+              <a:t>each</a:t>
+            </a:r>
+            <a:r>
+              <a:rPr lang="de-DE" dirty="0"/>
+              <a:t> </a:t>
+            </a:r>
+            <a:r>
+              <a:rPr lang="de-DE" dirty="0" err="1"/>
+              <a:t>node</a:t>
+            </a:r>
+            <a:r>
+              <a:rPr lang="de-DE" dirty="0"/>
+              <a:t> </a:t>
+            </a:r>
+            <a:r>
+              <a:rPr lang="de-DE" dirty="0" err="1"/>
+              <a:t>has</a:t>
+            </a:r>
+            <a:r>
+              <a:rPr lang="de-DE" dirty="0"/>
+              <a:t> a </a:t>
+            </a:r>
+            <a:r>
+              <a:rPr lang="de-DE" dirty="0" err="1"/>
+              <a:t>specific</a:t>
+            </a:r>
+            <a:r>
+              <a:rPr lang="de-DE" dirty="0"/>
+              <a:t> „</a:t>
+            </a:r>
+            <a:r>
+              <a:rPr lang="de-DE" dirty="0" err="1"/>
+              <a:t>analyze</a:t>
+            </a:r>
+            <a:r>
+              <a:rPr lang="de-DE" dirty="0"/>
+              <a:t>“ </a:t>
+            </a:r>
+            <a:r>
+              <a:rPr lang="de-DE" dirty="0" err="1"/>
+              <a:t>function</a:t>
+            </a:r>
+            <a:endParaRPr lang="de-DE" dirty="0"/>
+          </a:p>
+          <a:p>
+            <a:pPr lvl="1"/>
+            <a:r>
+              <a:rPr lang="de-DE" dirty="0"/>
+              <a:t>external code </a:t>
+            </a:r>
+            <a:r>
+              <a:rPr lang="de-DE" dirty="0" err="1"/>
+              <a:t>can</a:t>
+            </a:r>
+            <a:r>
+              <a:rPr lang="de-DE" dirty="0"/>
+              <a:t> </a:t>
+            </a:r>
+            <a:r>
+              <a:rPr lang="de-DE" dirty="0" err="1"/>
+              <a:t>be</a:t>
+            </a:r>
+            <a:r>
+              <a:rPr lang="de-DE" dirty="0"/>
+              <a:t> </a:t>
+            </a:r>
+            <a:r>
+              <a:rPr lang="de-DE" dirty="0" err="1"/>
+              <a:t>included</a:t>
+            </a:r>
+            <a:r>
+              <a:rPr lang="de-DE" dirty="0"/>
+              <a:t> </a:t>
+            </a:r>
+            <a:r>
+              <a:rPr lang="de-DE" dirty="0" err="1"/>
+              <a:t>as</a:t>
+            </a:r>
+            <a:r>
+              <a:rPr lang="de-DE" dirty="0"/>
+              <a:t> </a:t>
+            </a:r>
+            <a:r>
+              <a:rPr lang="de-DE" dirty="0" err="1"/>
+              <a:t>custom</a:t>
+            </a:r>
+            <a:r>
+              <a:rPr lang="de-DE" dirty="0"/>
+              <a:t> </a:t>
+            </a:r>
+            <a:r>
+              <a:rPr lang="de-DE" dirty="0" err="1"/>
+              <a:t>nodes</a:t>
+            </a:r>
+            <a:endParaRPr lang="de-DE" dirty="0"/>
+          </a:p>
+          <a:p>
+            <a:pPr lvl="1"/>
+            <a:r>
+              <a:rPr lang="de-DE" dirty="0"/>
+              <a:t>different </a:t>
+            </a:r>
+            <a:r>
+              <a:rPr lang="de-DE" dirty="0" err="1"/>
+              <a:t>analyzer</a:t>
+            </a:r>
+            <a:r>
+              <a:rPr lang="de-DE" dirty="0"/>
+              <a:t> </a:t>
+            </a:r>
+            <a:r>
+              <a:rPr lang="de-DE" dirty="0" err="1"/>
+              <a:t>modes</a:t>
+            </a:r>
+            <a:r>
+              <a:rPr lang="de-DE" dirty="0"/>
+              <a:t>: </a:t>
+            </a:r>
+            <a:r>
+              <a:rPr lang="de-DE" dirty="0" err="1"/>
+              <a:t>energy</a:t>
             </a:r>
             <a:r>
               <a:rPr lang="de-DE" dirty="0"/>
@@ -3754,15 +4779,7 @@
             </a:r>
             <a:r>
               <a:rPr lang="de-DE" dirty="0" err="1"/>
-              <a:t>memory</a:t>
-            </a:r>
-            <a:r>
-              <a:rPr lang="de-DE" dirty="0"/>
-              <a:t> </a:t>
-            </a:r>
-            <a:r>
-              <a:rPr lang="de-DE" dirty="0" err="1"/>
-              <a:t>efficient</a:t>
+              <a:t>raytracing</a:t>
             </a:r>
             <a:r>
               <a:rPr lang="de-DE" dirty="0"/>
@@ -3770,23 +4787,367 @@
             </a:r>
             <a:r>
               <a:rPr lang="de-DE" dirty="0" err="1"/>
-              <a:t>inclusion</a:t>
-            </a:r>
-            <a:r>
-              <a:rPr lang="de-DE" dirty="0"/>
-              <a:t> </a:t>
-            </a:r>
-            <a:r>
-              <a:rPr lang="de-DE" dirty="0" err="1"/>
-              <a:t>of</a:t>
-            </a:r>
-            <a:r>
-              <a:rPr lang="de-DE" dirty="0"/>
-              <a:t> external code…)</a:t>
-            </a:r>
-          </a:p>
-          <a:p>
+              <a:t>fourier</a:t>
+            </a:r>
+            <a:r>
+              <a:rPr lang="de-DE" dirty="0"/>
+              <a:t>, …</a:t>
+            </a:r>
+          </a:p>
+        </p:txBody>
+      </p:sp>
+      <p:pic>
+        <p:nvPicPr>
+          <p:cNvPr id="5" name="Grafik 4">
+            <a:extLst>
+              <a:ext uri="{FF2B5EF4-FFF2-40B4-BE49-F238E27FC236}">
+                <a16:creationId xmlns:a16="http://schemas.microsoft.com/office/drawing/2014/main" id="{C47D2B3C-10CA-42FC-9CC0-19806F40B179}"/>
+              </a:ext>
+            </a:extLst>
+          </p:cNvPr>
+          <p:cNvPicPr>
+            <a:picLocks noChangeAspect="1"/>
+          </p:cNvPicPr>
+          <p:nvPr/>
+        </p:nvPicPr>
+        <p:blipFill rotWithShape="1">
+          <a:blip r:embed="rId2">
+            <a:extLst>
+              <a:ext uri="{96DAC541-7B7A-43D3-8B79-37D633B846F1}">
+                <asvg:svgBlip xmlns:asvg="http://schemas.microsoft.com/office/drawing/2016/SVG/main" r:embed="rId3"/>
+              </a:ext>
+            </a:extLst>
+          </a:blip>
+          <a:srcRect l="4056" t="9260" b="21521"/>
+          <a:stretch/>
+        </p:blipFill>
+        <p:spPr>
+          <a:xfrm>
+            <a:off x="1743594" y="2481938"/>
+            <a:ext cx="5656811" cy="1285661"/>
+          </a:xfrm>
+          <a:prstGeom prst="rect">
+            <a:avLst/>
+          </a:prstGeom>
+        </p:spPr>
+      </p:pic>
+      <p:cxnSp>
+        <p:nvCxnSpPr>
+          <p:cNvPr id="7" name="Gerade Verbindung mit Pfeil 6">
+            <a:extLst>
+              <a:ext uri="{FF2B5EF4-FFF2-40B4-BE49-F238E27FC236}">
+                <a16:creationId xmlns:a16="http://schemas.microsoft.com/office/drawing/2014/main" id="{8DAAC21A-9928-418B-8A6D-2F7042C2348D}"/>
+              </a:ext>
+            </a:extLst>
+          </p:cNvPr>
+          <p:cNvCxnSpPr>
+            <a:cxnSpLocks/>
+          </p:cNvCxnSpPr>
+          <p:nvPr/>
+        </p:nvCxnSpPr>
+        <p:spPr>
+          <a:xfrm flipV="1">
+            <a:off x="2681323" y="3251960"/>
+            <a:ext cx="598142" cy="797827"/>
+          </a:xfrm>
+          <a:prstGeom prst="straightConnector1">
+            <a:avLst/>
+          </a:prstGeom>
+          <a:ln>
+            <a:solidFill>
+              <a:schemeClr val="tx1"/>
+            </a:solidFill>
+            <a:tailEnd type="triangle"/>
+          </a:ln>
+          <a:effectLst/>
+        </p:spPr>
+        <p:style>
+          <a:lnRef idx="2">
+            <a:schemeClr val="accent1"/>
+          </a:lnRef>
+          <a:fillRef idx="0">
+            <a:schemeClr val="accent1"/>
+          </a:fillRef>
+          <a:effectRef idx="1">
+            <a:schemeClr val="accent1"/>
+          </a:effectRef>
+          <a:fontRef idx="minor">
+            <a:schemeClr val="tx1"/>
+          </a:fontRef>
+        </p:style>
+      </p:cxnSp>
+      <p:sp>
+        <p:nvSpPr>
+          <p:cNvPr id="8" name="Textfeld 7">
+            <a:extLst>
+              <a:ext uri="{FF2B5EF4-FFF2-40B4-BE49-F238E27FC236}">
+                <a16:creationId xmlns:a16="http://schemas.microsoft.com/office/drawing/2014/main" id="{03FFA897-753D-46FB-8EB4-EEA820B3D017}"/>
+              </a:ext>
+            </a:extLst>
+          </p:cNvPr>
+          <p:cNvSpPr txBox="1"/>
+          <p:nvPr/>
+        </p:nvSpPr>
+        <p:spPr>
+          <a:xfrm>
+            <a:off x="941195" y="4096731"/>
+            <a:ext cx="2861488" cy="553998"/>
+          </a:xfrm>
+          <a:prstGeom prst="rect">
+            <a:avLst/>
+          </a:prstGeom>
+        </p:spPr>
+        <p:txBody>
+          <a:bodyPr vert="horz" wrap="none" lIns="91440" tIns="45720" rIns="91440" bIns="45720" rtlCol="0" anchor="t">
+            <a:spAutoFit/>
+          </a:bodyPr>
+          <a:lstStyle/>
+          <a:p>
+            <a:pPr algn="ctr"/>
+            <a:r>
+              <a:rPr lang="de-DE" dirty="0"/>
+              <a:t>„light“ </a:t>
+            </a:r>
+            <a:r>
+              <a:rPr lang="de-DE" dirty="0" err="1"/>
+              <a:t>data</a:t>
+            </a:r>
             <a:endParaRPr lang="de-DE" dirty="0"/>
+          </a:p>
+          <a:p>
+            <a:pPr algn="ctr"/>
+            <a:r>
+              <a:rPr lang="de-DE" sz="1200" dirty="0" err="1"/>
+              <a:t>energy</a:t>
+            </a:r>
+            <a:r>
+              <a:rPr lang="de-DE" sz="1200" dirty="0"/>
+              <a:t>, </a:t>
+            </a:r>
+            <a:r>
+              <a:rPr lang="de-DE" sz="1200" dirty="0" err="1"/>
+              <a:t>spectrum</a:t>
+            </a:r>
+            <a:r>
+              <a:rPr lang="de-DE" sz="1200" dirty="0"/>
+              <a:t>, </a:t>
+            </a:r>
+            <a:r>
+              <a:rPr lang="de-DE" sz="1200" dirty="0" err="1"/>
+              <a:t>nearfield</a:t>
+            </a:r>
+            <a:r>
+              <a:rPr lang="de-DE" sz="1200" dirty="0"/>
+              <a:t>, </a:t>
+            </a:r>
+            <a:r>
+              <a:rPr lang="de-DE" sz="1200" dirty="0" err="1"/>
+              <a:t>phase</a:t>
+            </a:r>
+            <a:r>
+              <a:rPr lang="de-DE" sz="1200" dirty="0"/>
+              <a:t>, …</a:t>
+            </a:r>
+          </a:p>
+        </p:txBody>
+      </p:sp>
+      <p:cxnSp>
+        <p:nvCxnSpPr>
+          <p:cNvPr id="11" name="Gerade Verbindung mit Pfeil 10">
+            <a:extLst>
+              <a:ext uri="{FF2B5EF4-FFF2-40B4-BE49-F238E27FC236}">
+                <a16:creationId xmlns:a16="http://schemas.microsoft.com/office/drawing/2014/main" id="{80CDA12C-44D6-4C56-9114-80FFAE03D83D}"/>
+              </a:ext>
+            </a:extLst>
+          </p:cNvPr>
+          <p:cNvCxnSpPr>
+            <a:cxnSpLocks/>
+          </p:cNvCxnSpPr>
+          <p:nvPr/>
+        </p:nvCxnSpPr>
+        <p:spPr>
+          <a:xfrm flipH="1" flipV="1">
+            <a:off x="4426243" y="3687304"/>
+            <a:ext cx="517018" cy="720832"/>
+          </a:xfrm>
+          <a:prstGeom prst="straightConnector1">
+            <a:avLst/>
+          </a:prstGeom>
+          <a:ln>
+            <a:solidFill>
+              <a:schemeClr val="tx1"/>
+            </a:solidFill>
+            <a:tailEnd type="triangle"/>
+          </a:ln>
+          <a:effectLst/>
+        </p:spPr>
+        <p:style>
+          <a:lnRef idx="2">
+            <a:schemeClr val="accent1"/>
+          </a:lnRef>
+          <a:fillRef idx="0">
+            <a:schemeClr val="accent1"/>
+          </a:fillRef>
+          <a:effectRef idx="1">
+            <a:schemeClr val="accent1"/>
+          </a:effectRef>
+          <a:fontRef idx="minor">
+            <a:schemeClr val="tx1"/>
+          </a:fontRef>
+        </p:style>
+      </p:cxnSp>
+      <p:sp>
+        <p:nvSpPr>
+          <p:cNvPr id="17" name="Textfeld 16">
+            <a:extLst>
+              <a:ext uri="{FF2B5EF4-FFF2-40B4-BE49-F238E27FC236}">
+                <a16:creationId xmlns:a16="http://schemas.microsoft.com/office/drawing/2014/main" id="{19588B8C-3CEF-4993-9B81-6D0AD15B4048}"/>
+              </a:ext>
+            </a:extLst>
+          </p:cNvPr>
+          <p:cNvSpPr txBox="1"/>
+          <p:nvPr/>
+        </p:nvSpPr>
+        <p:spPr>
+          <a:xfrm>
+            <a:off x="4010319" y="4384577"/>
+            <a:ext cx="2005677" cy="553998"/>
+          </a:xfrm>
+          <a:prstGeom prst="rect">
+            <a:avLst/>
+          </a:prstGeom>
+        </p:spPr>
+        <p:txBody>
+          <a:bodyPr vert="horz" wrap="none" lIns="91440" tIns="45720" rIns="91440" bIns="45720" rtlCol="0" anchor="t">
+            <a:spAutoFit/>
+          </a:bodyPr>
+          <a:lstStyle/>
+          <a:p>
+            <a:pPr algn="ctr"/>
+            <a:r>
+              <a:rPr lang="de-DE" dirty="0"/>
+              <a:t>„</a:t>
+            </a:r>
+            <a:r>
+              <a:rPr lang="de-DE" dirty="0" err="1"/>
+              <a:t>analyze</a:t>
+            </a:r>
+            <a:r>
+              <a:rPr lang="de-DE" dirty="0"/>
+              <a:t>“ </a:t>
+            </a:r>
+            <a:r>
+              <a:rPr lang="de-DE" dirty="0" err="1"/>
+              <a:t>function</a:t>
+            </a:r>
+            <a:endParaRPr lang="de-DE" dirty="0"/>
+          </a:p>
+          <a:p>
+            <a:pPr algn="ctr"/>
+            <a:r>
+              <a:rPr lang="de-DE" sz="1200" dirty="0"/>
+              <a:t>internal / external code, …</a:t>
+            </a:r>
+          </a:p>
+        </p:txBody>
+      </p:sp>
+      <p:cxnSp>
+        <p:nvCxnSpPr>
+          <p:cNvPr id="18" name="Gerade Verbindung mit Pfeil 17">
+            <a:extLst>
+              <a:ext uri="{FF2B5EF4-FFF2-40B4-BE49-F238E27FC236}">
+                <a16:creationId xmlns:a16="http://schemas.microsoft.com/office/drawing/2014/main" id="{996795F4-5721-45D7-8293-E73A439BE46A}"/>
+              </a:ext>
+            </a:extLst>
+          </p:cNvPr>
+          <p:cNvCxnSpPr>
+            <a:cxnSpLocks/>
+          </p:cNvCxnSpPr>
+          <p:nvPr/>
+        </p:nvCxnSpPr>
+        <p:spPr>
+          <a:xfrm flipH="1" flipV="1">
+            <a:off x="6582027" y="3687304"/>
+            <a:ext cx="334412" cy="547807"/>
+          </a:xfrm>
+          <a:prstGeom prst="straightConnector1">
+            <a:avLst/>
+          </a:prstGeom>
+          <a:ln>
+            <a:solidFill>
+              <a:schemeClr val="tx1"/>
+            </a:solidFill>
+            <a:tailEnd type="triangle"/>
+          </a:ln>
+          <a:effectLst/>
+        </p:spPr>
+        <p:style>
+          <a:lnRef idx="2">
+            <a:schemeClr val="accent1"/>
+          </a:lnRef>
+          <a:fillRef idx="0">
+            <a:schemeClr val="accent1"/>
+          </a:fillRef>
+          <a:effectRef idx="1">
+            <a:schemeClr val="accent1"/>
+          </a:effectRef>
+          <a:fontRef idx="minor">
+            <a:schemeClr val="tx1"/>
+          </a:fontRef>
+        </p:style>
+      </p:cxnSp>
+      <p:sp>
+        <p:nvSpPr>
+          <p:cNvPr id="21" name="Textfeld 20">
+            <a:extLst>
+              <a:ext uri="{FF2B5EF4-FFF2-40B4-BE49-F238E27FC236}">
+                <a16:creationId xmlns:a16="http://schemas.microsoft.com/office/drawing/2014/main" id="{F5A1A9A5-621A-415F-877D-332684F5D04D}"/>
+              </a:ext>
+            </a:extLst>
+          </p:cNvPr>
+          <p:cNvSpPr txBox="1"/>
+          <p:nvPr/>
+        </p:nvSpPr>
+        <p:spPr>
+          <a:xfrm>
+            <a:off x="6265663" y="4259978"/>
+            <a:ext cx="2005677" cy="553998"/>
+          </a:xfrm>
+          <a:prstGeom prst="rect">
+            <a:avLst/>
+          </a:prstGeom>
+        </p:spPr>
+        <p:txBody>
+          <a:bodyPr vert="horz" wrap="none" lIns="91440" tIns="45720" rIns="91440" bIns="45720" rtlCol="0" anchor="t">
+            <a:spAutoFit/>
+          </a:bodyPr>
+          <a:lstStyle/>
+          <a:p>
+            <a:pPr algn="ctr"/>
+            <a:r>
+              <a:rPr lang="de-DE" dirty="0"/>
+              <a:t>„</a:t>
+            </a:r>
+            <a:r>
+              <a:rPr lang="de-DE" dirty="0" err="1"/>
+              <a:t>report</a:t>
+            </a:r>
+            <a:r>
+              <a:rPr lang="de-DE" dirty="0"/>
+              <a:t>“ </a:t>
+            </a:r>
+            <a:r>
+              <a:rPr lang="de-DE" dirty="0" err="1"/>
+              <a:t>function</a:t>
+            </a:r>
+            <a:endParaRPr lang="de-DE" dirty="0"/>
+          </a:p>
+          <a:p>
+            <a:pPr algn="ctr"/>
+            <a:r>
+              <a:rPr lang="de-DE" sz="1200" dirty="0"/>
+              <a:t>internal / external code, …</a:t>
+            </a:r>
           </a:p>
         </p:txBody>
       </p:sp>
@@ -3825,6 +5186,218 @@
           <p:cNvPr id="2" name="Titel 1">
             <a:extLst>
               <a:ext uri="{FF2B5EF4-FFF2-40B4-BE49-F238E27FC236}">
+                <a16:creationId xmlns:a16="http://schemas.microsoft.com/office/drawing/2014/main" id="{FE38662E-3984-423A-88B2-EA83EF2A6FF6}"/>
+              </a:ext>
+            </a:extLst>
+          </p:cNvPr>
+          <p:cNvSpPr>
+            <a:spLocks noGrp="1"/>
+          </p:cNvSpPr>
+          <p:nvPr>
+            <p:ph type="title"/>
+          </p:nvPr>
+        </p:nvSpPr>
+        <p:spPr/>
+        <p:txBody>
+          <a:bodyPr/>
+          <a:lstStyle/>
+          <a:p>
+            <a:r>
+              <a:rPr lang="de-DE" dirty="0"/>
+              <a:t>Software </a:t>
+            </a:r>
+            <a:r>
+              <a:rPr lang="de-DE" dirty="0" err="1"/>
+              <a:t>base</a:t>
+            </a:r>
+            <a:endParaRPr lang="de-DE" dirty="0"/>
+          </a:p>
+        </p:txBody>
+      </p:sp>
+      <p:sp>
+        <p:nvSpPr>
+          <p:cNvPr id="8" name="Inhaltsplatzhalter 2">
+            <a:extLst>
+              <a:ext uri="{FF2B5EF4-FFF2-40B4-BE49-F238E27FC236}">
+                <a16:creationId xmlns:a16="http://schemas.microsoft.com/office/drawing/2014/main" id="{715D74FD-1EE1-4CA9-83CA-714C1F1AEF02}"/>
+              </a:ext>
+            </a:extLst>
+          </p:cNvPr>
+          <p:cNvSpPr>
+            <a:spLocks noGrp="1"/>
+          </p:cNvSpPr>
+          <p:nvPr>
+            <p:ph idx="1"/>
+          </p:nvPr>
+        </p:nvSpPr>
+        <p:spPr>
+          <a:xfrm>
+            <a:off x="317635" y="1088015"/>
+            <a:ext cx="8420176" cy="3677689"/>
+          </a:xfrm>
+        </p:spPr>
+        <p:txBody>
+          <a:bodyPr/>
+          <a:lstStyle/>
+          <a:p>
+            <a:r>
+              <a:rPr lang="de-DE" dirty="0"/>
+              <a:t>Software </a:t>
+            </a:r>
+            <a:r>
+              <a:rPr lang="de-DE" dirty="0" err="1"/>
+              <a:t>written</a:t>
+            </a:r>
+            <a:r>
+              <a:rPr lang="de-DE" dirty="0"/>
+              <a:t> in Rust</a:t>
+            </a:r>
+          </a:p>
+          <a:p>
+            <a:pPr lvl="1"/>
+            <a:r>
+              <a:rPr lang="de-DE" dirty="0" err="1"/>
+              <a:t>memory</a:t>
+            </a:r>
+            <a:r>
+              <a:rPr lang="de-DE" dirty="0"/>
+              <a:t> </a:t>
+            </a:r>
+            <a:r>
+              <a:rPr lang="de-DE" dirty="0" err="1"/>
+              <a:t>safety</a:t>
+            </a:r>
+            <a:r>
+              <a:rPr lang="de-DE" dirty="0"/>
+              <a:t> / </a:t>
+            </a:r>
+            <a:r>
+              <a:rPr lang="de-DE" dirty="0" err="1"/>
+              <a:t>efficiency</a:t>
+            </a:r>
+            <a:r>
+              <a:rPr lang="de-DE" dirty="0"/>
+              <a:t>,</a:t>
+            </a:r>
+          </a:p>
+          <a:p>
+            <a:pPr lvl="1"/>
+            <a:r>
+              <a:rPr lang="de-DE" dirty="0" err="1"/>
+              <a:t>speed</a:t>
+            </a:r>
+            <a:endParaRPr lang="de-DE" dirty="0"/>
+          </a:p>
+          <a:p>
+            <a:pPr lvl="1"/>
+            <a:r>
+              <a:rPr lang="de-DE" dirty="0"/>
+              <a:t>modern </a:t>
+            </a:r>
+            <a:r>
+              <a:rPr lang="de-DE" dirty="0" err="1"/>
+              <a:t>build</a:t>
+            </a:r>
+            <a:r>
+              <a:rPr lang="de-DE" dirty="0"/>
+              <a:t> </a:t>
+            </a:r>
+            <a:r>
+              <a:rPr lang="de-DE" dirty="0" err="1"/>
+              <a:t>environment</a:t>
+            </a:r>
+            <a:endParaRPr lang="de-DE" dirty="0"/>
+          </a:p>
+          <a:p>
+            <a:pPr lvl="1"/>
+            <a:r>
+              <a:rPr lang="de-DE" dirty="0"/>
+              <a:t>easy </a:t>
+            </a:r>
+            <a:r>
+              <a:rPr lang="de-DE" dirty="0" err="1"/>
+              <a:t>inclusion</a:t>
+            </a:r>
+            <a:r>
+              <a:rPr lang="de-DE" dirty="0"/>
+              <a:t> </a:t>
+            </a:r>
+            <a:r>
+              <a:rPr lang="de-DE" dirty="0" err="1"/>
+              <a:t>of</a:t>
+            </a:r>
+            <a:r>
+              <a:rPr lang="de-DE" dirty="0"/>
+              <a:t> external code (e.g. C/C++, Python, Julia, … )</a:t>
+            </a:r>
+          </a:p>
+        </p:txBody>
+      </p:sp>
+      <p:pic>
+        <p:nvPicPr>
+          <p:cNvPr id="10" name="Grafik 9">
+            <a:extLst>
+              <a:ext uri="{FF2B5EF4-FFF2-40B4-BE49-F238E27FC236}">
+                <a16:creationId xmlns:a16="http://schemas.microsoft.com/office/drawing/2014/main" id="{5202C494-4F67-4C77-9476-2C6B385AA353}"/>
+              </a:ext>
+            </a:extLst>
+          </p:cNvPr>
+          <p:cNvPicPr>
+            <a:picLocks noChangeAspect="1"/>
+          </p:cNvPicPr>
+          <p:nvPr/>
+        </p:nvPicPr>
+        <p:blipFill>
+          <a:blip r:embed="rId2"/>
+          <a:stretch>
+            <a:fillRect/>
+          </a:stretch>
+        </p:blipFill>
+        <p:spPr>
+          <a:xfrm>
+            <a:off x="3042325" y="2674464"/>
+            <a:ext cx="3059350" cy="2039965"/>
+          </a:xfrm>
+          <a:prstGeom prst="rect">
+            <a:avLst/>
+          </a:prstGeom>
+        </p:spPr>
+      </p:pic>
+    </p:spTree>
+    <p:extLst>
+      <p:ext uri="{BB962C8B-B14F-4D97-AF65-F5344CB8AC3E}">
+        <p14:creationId xmlns:p14="http://schemas.microsoft.com/office/powerpoint/2010/main" val="580862461"/>
+      </p:ext>
+    </p:extLst>
+  </p:cSld>
+  <p:clrMapOvr>
+    <a:masterClrMapping/>
+  </p:clrMapOvr>
+</p:sld>
+</file>
+
+<file path=ppt/slides/slide5.xml><?xml version="1.0" encoding="utf-8"?>
+<p:sld xmlns:a="http://schemas.openxmlformats.org/drawingml/2006/main" xmlns:r="http://schemas.openxmlformats.org/officeDocument/2006/relationships" xmlns:p="http://schemas.openxmlformats.org/presentationml/2006/main">
+  <p:cSld>
+    <p:spTree>
+      <p:nvGrpSpPr>
+        <p:cNvPr id="1" name=""/>
+        <p:cNvGrpSpPr/>
+        <p:nvPr/>
+      </p:nvGrpSpPr>
+      <p:grpSpPr>
+        <a:xfrm>
+          <a:off x="0" y="0"/>
+          <a:ext cx="0" cy="0"/>
+          <a:chOff x="0" y="0"/>
+          <a:chExt cx="0" cy="0"/>
+        </a:xfrm>
+      </p:grpSpPr>
+      <p:sp>
+        <p:nvSpPr>
+          <p:cNvPr id="2" name="Titel 1">
+            <a:extLst>
+              <a:ext uri="{FF2B5EF4-FFF2-40B4-BE49-F238E27FC236}">
                 <a16:creationId xmlns:a16="http://schemas.microsoft.com/office/drawing/2014/main" id="{B9CA8EC1-3CF4-458A-8FA1-BFA50B8DB7C6}"/>
               </a:ext>
             </a:extLst>
@@ -3842,8 +5415,12 @@
           <a:lstStyle/>
           <a:p>
             <a:r>
-              <a:rPr lang="de-DE" dirty="0"/>
-              <a:t>Simple </a:t>
+              <a:rPr lang="de-DE" dirty="0" err="1"/>
+              <a:t>Example</a:t>
+            </a:r>
+            <a:r>
+              <a:rPr lang="de-DE" dirty="0"/>
+              <a:t> </a:t>
             </a:r>
             <a:r>
               <a:rPr lang="de-DE" dirty="0" err="1"/>
@@ -3886,7 +5463,7 @@
           </p:cNvPicPr>
           <p:nvPr/>
         </p:nvPicPr>
-        <p:blipFill>
+        <p:blipFill rotWithShape="1">
           <a:blip r:embed="rId2">
             <a:extLst>
               <a:ext uri="{28A0092B-C50C-407E-A947-70E740481C1C}">
@@ -3894,14 +5471,13 @@
               </a:ext>
             </a:extLst>
           </a:blip>
-          <a:stretch>
-            <a:fillRect/>
-          </a:stretch>
+          <a:srcRect b="3881"/>
+          <a:stretch/>
         </p:blipFill>
         <p:spPr>
           <a:xfrm>
-            <a:off x="727319" y="1087438"/>
-            <a:ext cx="1402077" cy="3678237"/>
+            <a:off x="632517" y="976235"/>
+            <a:ext cx="1553793" cy="3918034"/>
           </a:xfrm>
           <a:prstGeom prst="rect">
             <a:avLst/>
@@ -3922,7 +5498,7 @@
         </p:nvSpPr>
         <p:spPr>
           <a:xfrm>
-            <a:off x="2024696" y="1172663"/>
+            <a:off x="2086571" y="1145163"/>
             <a:ext cx="1838965" cy="369332"/>
           </a:xfrm>
           <a:prstGeom prst="rect">
@@ -3966,7 +5542,7 @@
         </p:nvSpPr>
         <p:spPr>
           <a:xfrm>
-            <a:off x="2038656" y="2127677"/>
+            <a:off x="2059281" y="2141427"/>
             <a:ext cx="2146742" cy="369332"/>
           </a:xfrm>
           <a:prstGeom prst="rect">
@@ -4006,7 +5582,7 @@
         </p:nvSpPr>
         <p:spPr>
           <a:xfrm>
-            <a:off x="2079371" y="3138728"/>
+            <a:off x="2113746" y="3262478"/>
             <a:ext cx="1146468" cy="369332"/>
           </a:xfrm>
           <a:prstGeom prst="rect">
@@ -4072,588 +5648,6 @@
     <p:extLst>
       <p:ext uri="{BB962C8B-B14F-4D97-AF65-F5344CB8AC3E}">
         <p14:creationId xmlns:p14="http://schemas.microsoft.com/office/powerpoint/2010/main" val="3321478278"/>
-      </p:ext>
-    </p:extLst>
-  </p:cSld>
-  <p:clrMapOvr>
-    <a:masterClrMapping/>
-  </p:clrMapOvr>
-</p:sld>
-</file>
-
-<file path=ppt/slides/slide5.xml><?xml version="1.0" encoding="utf-8"?>
-<p:sld xmlns:a="http://schemas.openxmlformats.org/drawingml/2006/main" xmlns:r="http://schemas.openxmlformats.org/officeDocument/2006/relationships" xmlns:p="http://schemas.openxmlformats.org/presentationml/2006/main">
-  <p:cSld>
-    <p:spTree>
-      <p:nvGrpSpPr>
-        <p:cNvPr id="1" name=""/>
-        <p:cNvGrpSpPr/>
-        <p:nvPr/>
-      </p:nvGrpSpPr>
-      <p:grpSpPr>
-        <a:xfrm>
-          <a:off x="0" y="0"/>
-          <a:ext cx="0" cy="0"/>
-          <a:chOff x="0" y="0"/>
-          <a:chExt cx="0" cy="0"/>
-        </a:xfrm>
-      </p:grpSpPr>
-      <p:sp>
-        <p:nvSpPr>
-          <p:cNvPr id="2" name="Titel 1"/>
-          <p:cNvSpPr>
-            <a:spLocks noGrp="1"/>
-          </p:cNvSpPr>
-          <p:nvPr>
-            <p:ph type="title"/>
-          </p:nvPr>
-        </p:nvSpPr>
-        <p:spPr/>
-        <p:txBody>
-          <a:bodyPr/>
-          <a:lstStyle/>
-          <a:p>
-            <a:r>
-              <a:rPr lang="de-DE" dirty="0" err="1"/>
-              <a:t>Simulating</a:t>
-            </a:r>
-            <a:r>
-              <a:rPr lang="de-DE" dirty="0"/>
-              <a:t> double-pass </a:t>
-            </a:r>
-            <a:r>
-              <a:rPr lang="de-DE" dirty="0" err="1"/>
-              <a:t>systems</a:t>
-            </a:r>
-            <a:endParaRPr lang="en-US" dirty="0"/>
-          </a:p>
-        </p:txBody>
-      </p:sp>
-      <p:pic>
-        <p:nvPicPr>
-          <p:cNvPr id="7" name="Grafik 6"/>
-          <p:cNvPicPr>
-            <a:picLocks noChangeAspect="1"/>
-          </p:cNvPicPr>
-          <p:nvPr/>
-        </p:nvPicPr>
-        <p:blipFill>
-          <a:blip r:embed="rId2">
-            <a:extLst>
-              <a:ext uri="{28A0092B-C50C-407E-A947-70E740481C1C}">
-                <a14:useLocalDpi xmlns:a14="http://schemas.microsoft.com/office/drawing/2010/main" val="0"/>
-              </a:ext>
-            </a:extLst>
-          </a:blip>
-          <a:stretch>
-            <a:fillRect/>
-          </a:stretch>
-        </p:blipFill>
-        <p:spPr>
-          <a:xfrm>
-            <a:off x="230346" y="947873"/>
-            <a:ext cx="2666418" cy="847495"/>
-          </a:xfrm>
-          <a:prstGeom prst="rect">
-            <a:avLst/>
-          </a:prstGeom>
-        </p:spPr>
-      </p:pic>
-      <p:pic>
-        <p:nvPicPr>
-          <p:cNvPr id="6" name="Inhaltsplatzhalter 5"/>
-          <p:cNvPicPr>
-            <a:picLocks noGrp="1" noChangeAspect="1"/>
-          </p:cNvPicPr>
-          <p:nvPr>
-            <p:ph idx="1"/>
-          </p:nvPr>
-        </p:nvPicPr>
-        <p:blipFill>
-          <a:blip r:embed="rId3">
-            <a:extLst>
-              <a:ext uri="{28A0092B-C50C-407E-A947-70E740481C1C}">
-                <a14:useLocalDpi xmlns:a14="http://schemas.microsoft.com/office/drawing/2010/main" val="0"/>
-              </a:ext>
-            </a:extLst>
-          </a:blip>
-          <a:stretch>
-            <a:fillRect/>
-          </a:stretch>
-        </p:blipFill>
-        <p:spPr>
-          <a:xfrm>
-            <a:off x="229608" y="2052164"/>
-            <a:ext cx="1048492" cy="2659439"/>
-          </a:xfrm>
-        </p:spPr>
-      </p:pic>
-      <p:sp>
-        <p:nvSpPr>
-          <p:cNvPr id="8" name="Ellipse 7"/>
-          <p:cNvSpPr/>
-          <p:nvPr/>
-        </p:nvSpPr>
-        <p:spPr>
-          <a:xfrm>
-            <a:off x="286183" y="2589637"/>
-            <a:ext cx="670095" cy="432769"/>
-          </a:xfrm>
-          <a:prstGeom prst="ellipse">
-            <a:avLst/>
-          </a:prstGeom>
-          <a:solidFill>
-            <a:srgbClr val="FDBB63">
-              <a:alpha val="50196"/>
-            </a:srgbClr>
-          </a:solidFill>
-          <a:ln>
-            <a:noFill/>
-          </a:ln>
-          <a:effectLst/>
-        </p:spPr>
-        <p:style>
-          <a:lnRef idx="1">
-            <a:schemeClr val="accent1"/>
-          </a:lnRef>
-          <a:fillRef idx="3">
-            <a:schemeClr val="accent1"/>
-          </a:fillRef>
-          <a:effectRef idx="2">
-            <a:schemeClr val="accent1"/>
-          </a:effectRef>
-          <a:fontRef idx="minor">
-            <a:schemeClr val="lt1"/>
-          </a:fontRef>
-        </p:style>
-        <p:txBody>
-          <a:bodyPr rot="0" spcFirstLastPara="0" vertOverflow="overflow" horzOverflow="overflow" vert="horz" wrap="square" lIns="91440" tIns="45720" rIns="91440" bIns="45720" numCol="1" spcCol="0" rtlCol="0" fromWordArt="0" anchor="ctr" anchorCtr="0" forceAA="0" compatLnSpc="1">
-            <a:prstTxWarp prst="textNoShape">
-              <a:avLst/>
-            </a:prstTxWarp>
-            <a:noAutofit/>
-          </a:bodyPr>
-          <a:lstStyle/>
-          <a:p>
-            <a:pPr algn="ctr"/>
-            <a:endParaRPr lang="en-US"/>
-          </a:p>
-        </p:txBody>
-      </p:sp>
-      <p:cxnSp>
-        <p:nvCxnSpPr>
-          <p:cNvPr id="10" name="Gerade Verbindung mit Pfeil 9"/>
-          <p:cNvCxnSpPr/>
-          <p:nvPr/>
-        </p:nvCxnSpPr>
-        <p:spPr>
-          <a:xfrm flipH="1" flipV="1">
-            <a:off x="1088902" y="2806021"/>
-            <a:ext cx="467575" cy="160544"/>
-          </a:xfrm>
-          <a:prstGeom prst="straightConnector1">
-            <a:avLst/>
-          </a:prstGeom>
-          <a:ln>
-            <a:solidFill>
-              <a:schemeClr val="tx1"/>
-            </a:solidFill>
-            <a:tailEnd type="triangle"/>
-          </a:ln>
-          <a:effectLst/>
-        </p:spPr>
-        <p:style>
-          <a:lnRef idx="2">
-            <a:schemeClr val="accent1"/>
-          </a:lnRef>
-          <a:fillRef idx="0">
-            <a:schemeClr val="accent1"/>
-          </a:fillRef>
-          <a:effectRef idx="1">
-            <a:schemeClr val="accent1"/>
-          </a:effectRef>
-          <a:fontRef idx="minor">
-            <a:schemeClr val="tx1"/>
-          </a:fontRef>
-        </p:style>
-      </p:cxnSp>
-      <p:sp>
-        <p:nvSpPr>
-          <p:cNvPr id="12" name="Textfeld 11"/>
-          <p:cNvSpPr txBox="1"/>
-          <p:nvPr/>
-        </p:nvSpPr>
-        <p:spPr>
-          <a:xfrm>
-            <a:off x="1556477" y="2643399"/>
-            <a:ext cx="2159566" cy="646331"/>
-          </a:xfrm>
-          <a:prstGeom prst="rect">
-            <a:avLst/>
-          </a:prstGeom>
-        </p:spPr>
-        <p:txBody>
-          <a:bodyPr vert="horz" wrap="none" lIns="91440" tIns="45720" rIns="91440" bIns="45720" rtlCol="0" anchor="t">
-            <a:spAutoFit/>
-          </a:bodyPr>
-          <a:lstStyle/>
-          <a:p>
-            <a:pPr algn="l"/>
-            <a:r>
-              <a:rPr lang="de-DE" dirty="0" err="1">
-                <a:solidFill>
-                  <a:srgbClr val="FF0000"/>
-                </a:solidFill>
-              </a:rPr>
-              <a:t>Does</a:t>
-            </a:r>
-            <a:r>
-              <a:rPr lang="de-DE" dirty="0">
-                <a:solidFill>
-                  <a:srgbClr val="FF0000"/>
-                </a:solidFill>
-              </a:rPr>
-              <a:t> not </a:t>
-            </a:r>
-            <a:r>
-              <a:rPr lang="de-DE" dirty="0" err="1">
-                <a:solidFill>
-                  <a:srgbClr val="FF0000"/>
-                </a:solidFill>
-              </a:rPr>
-              <a:t>work</a:t>
-            </a:r>
-            <a:r>
-              <a:rPr lang="de-DE" dirty="0">
-                <a:solidFill>
-                  <a:srgbClr val="FF0000"/>
-                </a:solidFill>
-              </a:rPr>
-              <a:t>!</a:t>
-            </a:r>
-          </a:p>
-          <a:p>
-            <a:pPr algn="l"/>
-            <a:r>
-              <a:rPr lang="de-DE" dirty="0">
-                <a:solidFill>
-                  <a:srgbClr val="FF0000"/>
-                </a:solidFill>
-              </a:rPr>
-              <a:t>(</a:t>
-            </a:r>
-            <a:r>
-              <a:rPr lang="de-DE" dirty="0" err="1">
-                <a:solidFill>
-                  <a:srgbClr val="FF0000"/>
-                </a:solidFill>
-              </a:rPr>
-              <a:t>would</a:t>
-            </a:r>
-            <a:r>
-              <a:rPr lang="de-DE" dirty="0">
-                <a:solidFill>
-                  <a:srgbClr val="FF0000"/>
-                </a:solidFill>
-              </a:rPr>
-              <a:t> form a </a:t>
-            </a:r>
-            <a:r>
-              <a:rPr lang="de-DE" dirty="0" err="1">
-                <a:solidFill>
-                  <a:srgbClr val="FF0000"/>
-                </a:solidFill>
-              </a:rPr>
-              <a:t>loop</a:t>
-            </a:r>
-            <a:r>
-              <a:rPr lang="de-DE" dirty="0">
-                <a:solidFill>
-                  <a:srgbClr val="FF0000"/>
-                </a:solidFill>
-              </a:rPr>
-              <a:t>)</a:t>
-            </a:r>
-            <a:endParaRPr lang="en-US" dirty="0">
-              <a:solidFill>
-                <a:srgbClr val="FF0000"/>
-              </a:solidFill>
-            </a:endParaRPr>
-          </a:p>
-        </p:txBody>
-      </p:sp>
-      <p:sp>
-        <p:nvSpPr>
-          <p:cNvPr id="13" name="Textfeld 12"/>
-          <p:cNvSpPr txBox="1"/>
-          <p:nvPr/>
-        </p:nvSpPr>
-        <p:spPr>
-          <a:xfrm>
-            <a:off x="4220188" y="1075560"/>
-            <a:ext cx="3057247" cy="369332"/>
-          </a:xfrm>
-          <a:prstGeom prst="rect">
-            <a:avLst/>
-          </a:prstGeom>
-        </p:spPr>
-        <p:txBody>
-          <a:bodyPr vert="horz" wrap="none" lIns="91440" tIns="45720" rIns="91440" bIns="45720" rtlCol="0" anchor="t">
-            <a:spAutoFit/>
-          </a:bodyPr>
-          <a:lstStyle/>
-          <a:p>
-            <a:pPr algn="l"/>
-            <a:r>
-              <a:rPr lang="de-DE" dirty="0"/>
-              <a:t>Solution: „Reference </a:t>
-            </a:r>
-            <a:r>
-              <a:rPr lang="de-DE" dirty="0" err="1"/>
-              <a:t>nodes</a:t>
-            </a:r>
-            <a:r>
-              <a:rPr lang="de-DE" dirty="0"/>
-              <a:t>“</a:t>
-            </a:r>
-          </a:p>
-        </p:txBody>
-      </p:sp>
-      <p:pic>
-        <p:nvPicPr>
-          <p:cNvPr id="15" name="Grafik 14"/>
-          <p:cNvPicPr>
-            <a:picLocks noChangeAspect="1"/>
-          </p:cNvPicPr>
-          <p:nvPr/>
-        </p:nvPicPr>
-        <p:blipFill>
-          <a:blip r:embed="rId4">
-            <a:extLst>
-              <a:ext uri="{28A0092B-C50C-407E-A947-70E740481C1C}">
-                <a14:useLocalDpi xmlns:a14="http://schemas.microsoft.com/office/drawing/2010/main" val="0"/>
-              </a:ext>
-            </a:extLst>
-          </a:blip>
-          <a:stretch>
-            <a:fillRect/>
-          </a:stretch>
-        </p:blipFill>
-        <p:spPr>
-          <a:xfrm>
-            <a:off x="7658986" y="997642"/>
-            <a:ext cx="712921" cy="3777302"/>
-          </a:xfrm>
-          <a:prstGeom prst="rect">
-            <a:avLst/>
-          </a:prstGeom>
-        </p:spPr>
-      </p:pic>
-      <p:cxnSp>
-        <p:nvCxnSpPr>
-          <p:cNvPr id="17" name="Gerade Verbindung mit Pfeil 16"/>
-          <p:cNvCxnSpPr/>
-          <p:nvPr/>
-        </p:nvCxnSpPr>
-        <p:spPr>
-          <a:xfrm>
-            <a:off x="5814467" y="2966565"/>
-            <a:ext cx="1844519" cy="1403011"/>
-          </a:xfrm>
-          <a:prstGeom prst="straightConnector1">
-            <a:avLst/>
-          </a:prstGeom>
-          <a:ln>
-            <a:solidFill>
-              <a:schemeClr val="tx1"/>
-            </a:solidFill>
-            <a:tailEnd type="triangle"/>
-          </a:ln>
-          <a:effectLst/>
-        </p:spPr>
-        <p:style>
-          <a:lnRef idx="2">
-            <a:schemeClr val="accent1"/>
-          </a:lnRef>
-          <a:fillRef idx="0">
-            <a:schemeClr val="accent1"/>
-          </a:fillRef>
-          <a:effectRef idx="1">
-            <a:schemeClr val="accent1"/>
-          </a:effectRef>
-          <a:fontRef idx="minor">
-            <a:schemeClr val="tx1"/>
-          </a:fontRef>
-        </p:style>
-      </p:cxnSp>
-      <p:cxnSp>
-        <p:nvCxnSpPr>
-          <p:cNvPr id="19" name="Gerade Verbindung mit Pfeil 18"/>
-          <p:cNvCxnSpPr/>
-          <p:nvPr/>
-        </p:nvCxnSpPr>
-        <p:spPr>
-          <a:xfrm flipV="1">
-            <a:off x="5814467" y="1371620"/>
-            <a:ext cx="1898602" cy="1594944"/>
-          </a:xfrm>
-          <a:prstGeom prst="straightConnector1">
-            <a:avLst/>
-          </a:prstGeom>
-          <a:ln>
-            <a:solidFill>
-              <a:schemeClr val="tx1"/>
-            </a:solidFill>
-            <a:tailEnd type="triangle"/>
-          </a:ln>
-          <a:effectLst/>
-        </p:spPr>
-        <p:style>
-          <a:lnRef idx="2">
-            <a:schemeClr val="accent1"/>
-          </a:lnRef>
-          <a:fillRef idx="0">
-            <a:schemeClr val="accent1"/>
-          </a:fillRef>
-          <a:effectRef idx="1">
-            <a:schemeClr val="accent1"/>
-          </a:effectRef>
-          <a:fontRef idx="minor">
-            <a:schemeClr val="tx1"/>
-          </a:fontRef>
-        </p:style>
-      </p:cxnSp>
-      <p:cxnSp>
-        <p:nvCxnSpPr>
-          <p:cNvPr id="24" name="Gerade Verbindung mit Pfeil 23"/>
-          <p:cNvCxnSpPr/>
-          <p:nvPr/>
-        </p:nvCxnSpPr>
-        <p:spPr>
-          <a:xfrm flipV="1">
-            <a:off x="6545951" y="2052164"/>
-            <a:ext cx="1113035" cy="834129"/>
-          </a:xfrm>
-          <a:prstGeom prst="straightConnector1">
-            <a:avLst/>
-          </a:prstGeom>
-          <a:ln>
-            <a:solidFill>
-              <a:schemeClr val="tx1"/>
-            </a:solidFill>
-            <a:tailEnd type="triangle"/>
-          </a:ln>
-          <a:effectLst/>
-        </p:spPr>
-        <p:style>
-          <a:lnRef idx="2">
-            <a:schemeClr val="accent1"/>
-          </a:lnRef>
-          <a:fillRef idx="0">
-            <a:schemeClr val="accent1"/>
-          </a:fillRef>
-          <a:effectRef idx="1">
-            <a:schemeClr val="accent1"/>
-          </a:effectRef>
-          <a:fontRef idx="minor">
-            <a:schemeClr val="tx1"/>
-          </a:fontRef>
-        </p:style>
-      </p:cxnSp>
-      <p:cxnSp>
-        <p:nvCxnSpPr>
-          <p:cNvPr id="25" name="Gerade Verbindung mit Pfeil 24"/>
-          <p:cNvCxnSpPr/>
-          <p:nvPr/>
-        </p:nvCxnSpPr>
-        <p:spPr>
-          <a:xfrm>
-            <a:off x="6545951" y="2886293"/>
-            <a:ext cx="1111872" cy="759049"/>
-          </a:xfrm>
-          <a:prstGeom prst="straightConnector1">
-            <a:avLst/>
-          </a:prstGeom>
-          <a:ln>
-            <a:solidFill>
-              <a:schemeClr val="tx1"/>
-            </a:solidFill>
-            <a:tailEnd type="triangle"/>
-          </a:ln>
-          <a:effectLst/>
-        </p:spPr>
-        <p:style>
-          <a:lnRef idx="2">
-            <a:schemeClr val="accent1"/>
-          </a:lnRef>
-          <a:fillRef idx="0">
-            <a:schemeClr val="accent1"/>
-          </a:fillRef>
-          <a:effectRef idx="1">
-            <a:schemeClr val="accent1"/>
-          </a:effectRef>
-          <a:fontRef idx="minor">
-            <a:schemeClr val="tx1"/>
-          </a:fontRef>
-        </p:style>
-      </p:cxnSp>
-      <p:sp>
-        <p:nvSpPr>
-          <p:cNvPr id="29" name="Textfeld 28"/>
-          <p:cNvSpPr txBox="1"/>
-          <p:nvPr/>
-        </p:nvSpPr>
-        <p:spPr>
-          <a:xfrm>
-            <a:off x="4097594" y="2561197"/>
-            <a:ext cx="1787669" cy="646331"/>
-          </a:xfrm>
-          <a:prstGeom prst="rect">
-            <a:avLst/>
-          </a:prstGeom>
-        </p:spPr>
-        <p:txBody>
-          <a:bodyPr vert="horz" wrap="none" lIns="91440" tIns="45720" rIns="91440" bIns="45720" rtlCol="0" anchor="t">
-            <a:spAutoFit/>
-          </a:bodyPr>
-          <a:lstStyle/>
-          <a:p>
-            <a:pPr algn="l"/>
-            <a:r>
-              <a:rPr lang="de-DE" dirty="0" err="1"/>
-              <a:t>linked</a:t>
-            </a:r>
-            <a:r>
-              <a:rPr lang="de-DE" dirty="0"/>
-              <a:t> </a:t>
-            </a:r>
-            <a:r>
-              <a:rPr lang="de-DE" dirty="0" err="1"/>
-              <a:t>elements</a:t>
-            </a:r>
-            <a:endParaRPr lang="de-DE" dirty="0"/>
-          </a:p>
-          <a:p>
-            <a:pPr algn="l"/>
-            <a:r>
-              <a:rPr lang="de-DE" dirty="0"/>
-              <a:t>(</a:t>
-            </a:r>
-            <a:r>
-              <a:rPr lang="de-DE" dirty="0" err="1"/>
-              <a:t>inverted</a:t>
-            </a:r>
-            <a:r>
-              <a:rPr lang="de-DE" dirty="0"/>
-              <a:t>)</a:t>
-            </a:r>
-          </a:p>
-        </p:txBody>
-      </p:sp>
-    </p:spTree>
-    <p:extLst>
-      <p:ext uri="{BB962C8B-B14F-4D97-AF65-F5344CB8AC3E}">
-        <p14:creationId xmlns:p14="http://schemas.microsoft.com/office/powerpoint/2010/main" val="608887795"/>
       </p:ext>
     </p:extLst>
   </p:cSld>
@@ -4717,13 +5711,11 @@
       </p:sp>
       <p:pic>
         <p:nvPicPr>
-          <p:cNvPr id="4" name="Inhaltsplatzhalter 3"/>
+          <p:cNvPr id="5" name="Grafik 4"/>
           <p:cNvPicPr>
-            <a:picLocks noGrp="1" noChangeAspect="1"/>
+            <a:picLocks noChangeAspect="1"/>
           </p:cNvPicPr>
-          <p:nvPr>
-            <p:ph idx="1"/>
-          </p:nvPr>
+          <p:nvPr/>
         </p:nvPicPr>
         <p:blipFill>
           <a:blip r:embed="rId2">
@@ -4739,41 +5731,207 @@
         </p:blipFill>
         <p:spPr>
           <a:xfrm>
-            <a:off x="4785503" y="1087438"/>
-            <a:ext cx="782402" cy="3678237"/>
-          </a:xfrm>
+            <a:off x="227748" y="986151"/>
+            <a:ext cx="3547669" cy="1800452"/>
+          </a:xfrm>
+          <a:prstGeom prst="rect">
+            <a:avLst/>
+          </a:prstGeom>
         </p:spPr>
       </p:pic>
       <p:pic>
         <p:nvPicPr>
-          <p:cNvPr id="5" name="Grafik 4"/>
+          <p:cNvPr id="8" name="Grafik 7">
+            <a:extLst>
+              <a:ext uri="{FF2B5EF4-FFF2-40B4-BE49-F238E27FC236}">
+                <a16:creationId xmlns:a16="http://schemas.microsoft.com/office/drawing/2014/main" id="{1936AD83-B84D-416A-A530-FBEAF1EF0F46}"/>
+              </a:ext>
+            </a:extLst>
+          </p:cNvPr>
           <p:cNvPicPr>
             <a:picLocks noChangeAspect="1"/>
           </p:cNvPicPr>
           <p:nvPr/>
         </p:nvPicPr>
-        <p:blipFill>
+        <p:blipFill rotWithShape="1">
           <a:blip r:embed="rId3">
             <a:extLst>
-              <a:ext uri="{28A0092B-C50C-407E-A947-70E740481C1C}">
-                <a14:useLocalDpi xmlns:a14="http://schemas.microsoft.com/office/drawing/2010/main" val="0"/>
+              <a:ext uri="{96DAC541-7B7A-43D3-8B79-37D633B846F1}">
+                <asvg:svgBlip xmlns:asvg="http://schemas.microsoft.com/office/drawing/2016/SVG/main" r:embed="rId4"/>
               </a:ext>
             </a:extLst>
           </a:blip>
-          <a:stretch>
-            <a:fillRect/>
-          </a:stretch>
+          <a:srcRect b="11531"/>
+          <a:stretch/>
         </p:blipFill>
         <p:spPr>
           <a:xfrm>
-            <a:off x="317129" y="1543041"/>
-            <a:ext cx="3547669" cy="1800452"/>
+            <a:off x="247507" y="2957175"/>
+            <a:ext cx="8648986" cy="1917978"/>
           </a:xfrm>
           <a:prstGeom prst="rect">
             <a:avLst/>
           </a:prstGeom>
         </p:spPr>
       </p:pic>
+      <p:cxnSp>
+        <p:nvCxnSpPr>
+          <p:cNvPr id="10" name="Gerade Verbindung mit Pfeil 9">
+            <a:extLst>
+              <a:ext uri="{FF2B5EF4-FFF2-40B4-BE49-F238E27FC236}">
+                <a16:creationId xmlns:a16="http://schemas.microsoft.com/office/drawing/2014/main" id="{7DF3F5CC-B349-422A-AD84-B0B81B0AF217}"/>
+              </a:ext>
+            </a:extLst>
+          </p:cNvPr>
+          <p:cNvCxnSpPr>
+            <a:cxnSpLocks/>
+          </p:cNvCxnSpPr>
+          <p:nvPr/>
+        </p:nvCxnSpPr>
+        <p:spPr>
+          <a:xfrm>
+            <a:off x="5122015" y="1766923"/>
+            <a:ext cx="646268" cy="1430039"/>
+          </a:xfrm>
+          <a:prstGeom prst="straightConnector1">
+            <a:avLst/>
+          </a:prstGeom>
+          <a:ln>
+            <a:solidFill>
+              <a:schemeClr val="tx1"/>
+            </a:solidFill>
+            <a:tailEnd type="triangle"/>
+          </a:ln>
+          <a:effectLst/>
+        </p:spPr>
+        <p:style>
+          <a:lnRef idx="2">
+            <a:schemeClr val="accent1"/>
+          </a:lnRef>
+          <a:fillRef idx="0">
+            <a:schemeClr val="accent1"/>
+          </a:fillRef>
+          <a:effectRef idx="1">
+            <a:schemeClr val="accent1"/>
+          </a:effectRef>
+          <a:fontRef idx="minor">
+            <a:schemeClr val="tx1"/>
+          </a:fontRef>
+        </p:style>
+      </p:cxnSp>
+      <p:cxnSp>
+        <p:nvCxnSpPr>
+          <p:cNvPr id="13" name="Gerade Verbindung mit Pfeil 12">
+            <a:extLst>
+              <a:ext uri="{FF2B5EF4-FFF2-40B4-BE49-F238E27FC236}">
+                <a16:creationId xmlns:a16="http://schemas.microsoft.com/office/drawing/2014/main" id="{604D7F32-432F-49B9-A69D-AB16DDF187F6}"/>
+              </a:ext>
+            </a:extLst>
+          </p:cNvPr>
+          <p:cNvCxnSpPr>
+            <a:cxnSpLocks/>
+          </p:cNvCxnSpPr>
+          <p:nvPr/>
+        </p:nvCxnSpPr>
+        <p:spPr>
+          <a:xfrm flipH="1">
+            <a:off x="3300091" y="1766923"/>
+            <a:ext cx="1821924" cy="1430039"/>
+          </a:xfrm>
+          <a:prstGeom prst="straightConnector1">
+            <a:avLst/>
+          </a:prstGeom>
+          <a:ln>
+            <a:solidFill>
+              <a:schemeClr val="tx1"/>
+            </a:solidFill>
+            <a:tailEnd type="triangle"/>
+          </a:ln>
+          <a:effectLst/>
+        </p:spPr>
+        <p:style>
+          <a:lnRef idx="2">
+            <a:schemeClr val="accent1"/>
+          </a:lnRef>
+          <a:fillRef idx="0">
+            <a:schemeClr val="accent1"/>
+          </a:fillRef>
+          <a:effectRef idx="1">
+            <a:schemeClr val="accent1"/>
+          </a:effectRef>
+          <a:fontRef idx="minor">
+            <a:schemeClr val="tx1"/>
+          </a:fontRef>
+        </p:style>
+      </p:cxnSp>
+      <p:sp>
+        <p:nvSpPr>
+          <p:cNvPr id="21" name="Textfeld 20">
+            <a:extLst>
+              <a:ext uri="{FF2B5EF4-FFF2-40B4-BE49-F238E27FC236}">
+                <a16:creationId xmlns:a16="http://schemas.microsoft.com/office/drawing/2014/main" id="{0A0347D8-5AE8-4CA2-800A-9157ABF146A7}"/>
+              </a:ext>
+            </a:extLst>
+          </p:cNvPr>
+          <p:cNvSpPr txBox="1"/>
+          <p:nvPr/>
+        </p:nvSpPr>
+        <p:spPr>
+          <a:xfrm>
+            <a:off x="3952464" y="1058747"/>
+            <a:ext cx="2339102" cy="646331"/>
+          </a:xfrm>
+          <a:prstGeom prst="rect">
+            <a:avLst/>
+          </a:prstGeom>
+        </p:spPr>
+        <p:txBody>
+          <a:bodyPr vert="horz" wrap="none" lIns="91440" tIns="45720" rIns="91440" bIns="45720" rtlCol="0" anchor="t">
+            <a:spAutoFit/>
+          </a:bodyPr>
+          <a:lstStyle/>
+          <a:p>
+            <a:pPr algn="l"/>
+            <a:r>
+              <a:rPr lang="de-DE" dirty="0"/>
+              <a:t>„</a:t>
+            </a:r>
+            <a:r>
+              <a:rPr lang="de-DE" dirty="0" err="1"/>
+              <a:t>reference</a:t>
+            </a:r>
+            <a:r>
+              <a:rPr lang="de-DE" dirty="0"/>
+              <a:t>“ </a:t>
+            </a:r>
+            <a:r>
+              <a:rPr lang="de-DE" dirty="0" err="1"/>
+              <a:t>nodes</a:t>
+            </a:r>
+            <a:r>
+              <a:rPr lang="de-DE" dirty="0"/>
+              <a:t> </a:t>
+            </a:r>
+            <a:r>
+              <a:rPr lang="de-DE" dirty="0" err="1"/>
+              <a:t>for</a:t>
+            </a:r>
+            <a:endParaRPr lang="de-DE" dirty="0"/>
+          </a:p>
+          <a:p>
+            <a:pPr algn="l"/>
+            <a:r>
+              <a:rPr lang="de-DE" dirty="0"/>
+              <a:t>double-pass </a:t>
+            </a:r>
+            <a:r>
+              <a:rPr lang="de-DE" dirty="0" err="1"/>
+              <a:t>systems</a:t>
+            </a:r>
+            <a:endParaRPr lang="de-DE" dirty="0"/>
+          </a:p>
+        </p:txBody>
+      </p:sp>
     </p:spTree>
     <p:extLst>
       <p:ext uri="{BB962C8B-B14F-4D97-AF65-F5344CB8AC3E}">
@@ -4788,6 +5946,505 @@
 </file>
 
 <file path=ppt/slides/slide7.xml><?xml version="1.0" encoding="utf-8"?>
+<p:sld xmlns:a="http://schemas.openxmlformats.org/drawingml/2006/main" xmlns:r="http://schemas.openxmlformats.org/officeDocument/2006/relationships" xmlns:p="http://schemas.openxmlformats.org/presentationml/2006/main">
+  <p:cSld>
+    <p:spTree>
+      <p:nvGrpSpPr>
+        <p:cNvPr id="1" name=""/>
+        <p:cNvGrpSpPr/>
+        <p:nvPr/>
+      </p:nvGrpSpPr>
+      <p:grpSpPr>
+        <a:xfrm>
+          <a:off x="0" y="0"/>
+          <a:ext cx="0" cy="0"/>
+          <a:chOff x="0" y="0"/>
+          <a:chExt cx="0" cy="0"/>
+        </a:xfrm>
+      </p:grpSpPr>
+      <p:sp>
+        <p:nvSpPr>
+          <p:cNvPr id="2" name="Titel 1">
+            <a:extLst>
+              <a:ext uri="{FF2B5EF4-FFF2-40B4-BE49-F238E27FC236}">
+                <a16:creationId xmlns:a16="http://schemas.microsoft.com/office/drawing/2014/main" id="{6B798A57-AD7B-4FFF-8ED9-54AE6477A2F9}"/>
+              </a:ext>
+            </a:extLst>
+          </p:cNvPr>
+          <p:cNvSpPr>
+            <a:spLocks noGrp="1"/>
+          </p:cNvSpPr>
+          <p:nvPr>
+            <p:ph type="title"/>
+          </p:nvPr>
+        </p:nvSpPr>
+        <p:spPr/>
+        <p:txBody>
+          <a:bodyPr/>
+          <a:lstStyle/>
+          <a:p>
+            <a:r>
+              <a:rPr lang="de-DE" dirty="0" err="1"/>
+              <a:t>Node</a:t>
+            </a:r>
+            <a:r>
+              <a:rPr lang="de-DE" dirty="0"/>
+              <a:t> </a:t>
+            </a:r>
+            <a:r>
+              <a:rPr lang="de-DE" dirty="0" err="1"/>
+              <a:t>groups</a:t>
+            </a:r>
+            <a:endParaRPr lang="de-DE" dirty="0"/>
+          </a:p>
+        </p:txBody>
+      </p:sp>
+      <p:sp>
+        <p:nvSpPr>
+          <p:cNvPr id="3" name="Inhaltsplatzhalter 2">
+            <a:extLst>
+              <a:ext uri="{FF2B5EF4-FFF2-40B4-BE49-F238E27FC236}">
+                <a16:creationId xmlns:a16="http://schemas.microsoft.com/office/drawing/2014/main" id="{40D819B0-18D4-41D3-8447-28A876755D42}"/>
+              </a:ext>
+            </a:extLst>
+          </p:cNvPr>
+          <p:cNvSpPr>
+            <a:spLocks noGrp="1"/>
+          </p:cNvSpPr>
+          <p:nvPr>
+            <p:ph idx="1"/>
+          </p:nvPr>
+        </p:nvSpPr>
+        <p:spPr>
+          <a:xfrm>
+            <a:off x="317635" y="964263"/>
+            <a:ext cx="8420176" cy="397025"/>
+          </a:xfrm>
+        </p:spPr>
+        <p:txBody>
+          <a:bodyPr/>
+          <a:lstStyle/>
+          <a:p>
+            <a:r>
+              <a:rPr lang="de-DE" dirty="0"/>
+              <a:t>Nodes </a:t>
+            </a:r>
+            <a:r>
+              <a:rPr lang="de-DE" dirty="0" err="1"/>
+              <a:t>can</a:t>
+            </a:r>
+            <a:r>
+              <a:rPr lang="de-DE" dirty="0"/>
+              <a:t> </a:t>
+            </a:r>
+            <a:r>
+              <a:rPr lang="de-DE" dirty="0" err="1"/>
+              <a:t>be</a:t>
+            </a:r>
+            <a:r>
+              <a:rPr lang="de-DE" dirty="0"/>
+              <a:t> </a:t>
+            </a:r>
+            <a:r>
+              <a:rPr lang="de-DE" dirty="0" err="1"/>
+              <a:t>grouped</a:t>
+            </a:r>
+            <a:r>
+              <a:rPr lang="de-DE" dirty="0"/>
+              <a:t> and </a:t>
+            </a:r>
+            <a:r>
+              <a:rPr lang="de-DE" dirty="0" err="1"/>
+              <a:t>infinitely</a:t>
+            </a:r>
+            <a:r>
+              <a:rPr lang="de-DE" dirty="0"/>
+              <a:t> </a:t>
+            </a:r>
+            <a:r>
+              <a:rPr lang="de-DE" dirty="0" err="1"/>
+              <a:t>nested</a:t>
+            </a:r>
+            <a:endParaRPr lang="de-DE" dirty="0"/>
+          </a:p>
+        </p:txBody>
+      </p:sp>
+      <p:pic>
+        <p:nvPicPr>
+          <p:cNvPr id="5" name="Grafik 4">
+            <a:extLst>
+              <a:ext uri="{FF2B5EF4-FFF2-40B4-BE49-F238E27FC236}">
+                <a16:creationId xmlns:a16="http://schemas.microsoft.com/office/drawing/2014/main" id="{0797082F-37A8-46EE-ADE3-16AFCD650274}"/>
+              </a:ext>
+            </a:extLst>
+          </p:cNvPr>
+          <p:cNvPicPr>
+            <a:picLocks noChangeAspect="1"/>
+          </p:cNvPicPr>
+          <p:nvPr/>
+        </p:nvPicPr>
+        <p:blipFill rotWithShape="1">
+          <a:blip r:embed="rId2">
+            <a:extLst>
+              <a:ext uri="{96DAC541-7B7A-43D3-8B79-37D633B846F1}">
+                <asvg:svgBlip xmlns:asvg="http://schemas.microsoft.com/office/drawing/2016/SVG/main" r:embed="rId3"/>
+              </a:ext>
+            </a:extLst>
+          </a:blip>
+          <a:srcRect b="8314"/>
+          <a:stretch/>
+        </p:blipFill>
+        <p:spPr>
+          <a:xfrm>
+            <a:off x="644548" y="1314710"/>
+            <a:ext cx="7854903" cy="1778778"/>
+          </a:xfrm>
+          <a:prstGeom prst="rect">
+            <a:avLst/>
+          </a:prstGeom>
+        </p:spPr>
+      </p:pic>
+      <p:sp>
+        <p:nvSpPr>
+          <p:cNvPr id="6" name="Inhaltsplatzhalter 2">
+            <a:extLst>
+              <a:ext uri="{FF2B5EF4-FFF2-40B4-BE49-F238E27FC236}">
+                <a16:creationId xmlns:a16="http://schemas.microsoft.com/office/drawing/2014/main" id="{4154630D-5B9F-4295-A596-3319451CCC24}"/>
+              </a:ext>
+            </a:extLst>
+          </p:cNvPr>
+          <p:cNvSpPr txBox="1">
+            <a:spLocks/>
+          </p:cNvSpPr>
+          <p:nvPr/>
+        </p:nvSpPr>
+        <p:spPr>
+          <a:xfrm>
+            <a:off x="325660" y="3082967"/>
+            <a:ext cx="8420176" cy="397025"/>
+          </a:xfrm>
+          <a:prstGeom prst="rect">
+            <a:avLst/>
+          </a:prstGeom>
+        </p:spPr>
+        <p:txBody>
+          <a:bodyPr vert="horz" lIns="91440" tIns="45720" rIns="91440" bIns="45720" rtlCol="0">
+            <a:noAutofit/>
+          </a:bodyPr>
+          <a:lstStyle>
+            <a:lvl1pPr marL="257175" indent="-257175" algn="l" defTabSz="342900" rtl="0" eaLnBrk="1" latinLnBrk="0" hangingPunct="1">
+              <a:spcBef>
+                <a:spcPct val="20000"/>
+              </a:spcBef>
+              <a:buClr>
+                <a:srgbClr val="FDBB63"/>
+              </a:buClr>
+              <a:buFont typeface="Wingdings" charset="2"/>
+              <a:buChar char="§"/>
+              <a:defRPr sz="1800" kern="1200">
+                <a:solidFill>
+                  <a:srgbClr val="333333"/>
+                </a:solidFill>
+                <a:latin typeface="Arial"/>
+                <a:ea typeface="+mn-ea"/>
+                <a:cs typeface="Arial"/>
+              </a:defRPr>
+            </a:lvl1pPr>
+            <a:lvl2pPr marL="557213" indent="-214313" algn="l" defTabSz="342900" rtl="0" eaLnBrk="1" latinLnBrk="0" hangingPunct="1">
+              <a:spcBef>
+                <a:spcPct val="20000"/>
+              </a:spcBef>
+              <a:buClr>
+                <a:srgbClr val="FDBB63"/>
+              </a:buClr>
+              <a:buFont typeface="Wingdings" charset="2"/>
+              <a:buChar char="§"/>
+              <a:defRPr sz="1500" kern="1200">
+                <a:solidFill>
+                  <a:srgbClr val="333333"/>
+                </a:solidFill>
+                <a:latin typeface="Arial"/>
+                <a:ea typeface="+mn-ea"/>
+                <a:cs typeface="Arial"/>
+              </a:defRPr>
+            </a:lvl2pPr>
+            <a:lvl3pPr marL="857250" indent="-171450" algn="l" defTabSz="342900" rtl="0" eaLnBrk="1" latinLnBrk="0" hangingPunct="1">
+              <a:spcBef>
+                <a:spcPct val="20000"/>
+              </a:spcBef>
+              <a:buClr>
+                <a:srgbClr val="FDBB63"/>
+              </a:buClr>
+              <a:buFont typeface="Wingdings" charset="2"/>
+              <a:buChar char="§"/>
+              <a:defRPr sz="1350" kern="1200">
+                <a:solidFill>
+                  <a:srgbClr val="333333"/>
+                </a:solidFill>
+                <a:latin typeface="Arial"/>
+                <a:ea typeface="+mn-ea"/>
+                <a:cs typeface="Arial"/>
+              </a:defRPr>
+            </a:lvl3pPr>
+            <a:lvl4pPr marL="1200150" indent="-171450" algn="l" defTabSz="342900" rtl="0" eaLnBrk="1" latinLnBrk="0" hangingPunct="1">
+              <a:spcBef>
+                <a:spcPct val="20000"/>
+              </a:spcBef>
+              <a:buClr>
+                <a:srgbClr val="FDBB63"/>
+              </a:buClr>
+              <a:buFont typeface="Wingdings" charset="2"/>
+              <a:buChar char="§"/>
+              <a:defRPr sz="1200" kern="1200">
+                <a:solidFill>
+                  <a:srgbClr val="333333"/>
+                </a:solidFill>
+                <a:latin typeface="Arial"/>
+                <a:ea typeface="+mn-ea"/>
+                <a:cs typeface="Arial"/>
+              </a:defRPr>
+            </a:lvl4pPr>
+            <a:lvl5pPr marL="1543050" indent="-171450" algn="l" defTabSz="342900" rtl="0" eaLnBrk="1" latinLnBrk="0" hangingPunct="1">
+              <a:spcBef>
+                <a:spcPct val="20000"/>
+              </a:spcBef>
+              <a:buClr>
+                <a:srgbClr val="FDBB63"/>
+              </a:buClr>
+              <a:buFont typeface="Wingdings" charset="2"/>
+              <a:buChar char="§"/>
+              <a:defRPr sz="1050" kern="1200">
+                <a:solidFill>
+                  <a:srgbClr val="333333"/>
+                </a:solidFill>
+                <a:latin typeface="Arial"/>
+                <a:ea typeface="+mn-ea"/>
+                <a:cs typeface="Arial"/>
+              </a:defRPr>
+            </a:lvl5pPr>
+            <a:lvl6pPr marL="1885950" indent="-171450" algn="l" defTabSz="342900" rtl="0" eaLnBrk="1" latinLnBrk="0" hangingPunct="1">
+              <a:spcBef>
+                <a:spcPct val="20000"/>
+              </a:spcBef>
+              <a:buFont typeface="Arial"/>
+              <a:buChar char="•"/>
+              <a:defRPr sz="1500" kern="1200">
+                <a:solidFill>
+                  <a:schemeClr val="tx1"/>
+                </a:solidFill>
+                <a:latin typeface="+mn-lt"/>
+                <a:ea typeface="+mn-ea"/>
+                <a:cs typeface="+mn-cs"/>
+              </a:defRPr>
+            </a:lvl6pPr>
+            <a:lvl7pPr marL="2228850" indent="-171450" algn="l" defTabSz="342900" rtl="0" eaLnBrk="1" latinLnBrk="0" hangingPunct="1">
+              <a:spcBef>
+                <a:spcPct val="20000"/>
+              </a:spcBef>
+              <a:buFont typeface="Arial"/>
+              <a:buChar char="•"/>
+              <a:defRPr sz="1500" kern="1200">
+                <a:solidFill>
+                  <a:schemeClr val="tx1"/>
+                </a:solidFill>
+                <a:latin typeface="+mn-lt"/>
+                <a:ea typeface="+mn-ea"/>
+                <a:cs typeface="+mn-cs"/>
+              </a:defRPr>
+            </a:lvl7pPr>
+            <a:lvl8pPr marL="2571750" indent="-171450" algn="l" defTabSz="342900" rtl="0" eaLnBrk="1" latinLnBrk="0" hangingPunct="1">
+              <a:spcBef>
+                <a:spcPct val="20000"/>
+              </a:spcBef>
+              <a:buFont typeface="Arial"/>
+              <a:buChar char="•"/>
+              <a:defRPr sz="1500" kern="1200">
+                <a:solidFill>
+                  <a:schemeClr val="tx1"/>
+                </a:solidFill>
+                <a:latin typeface="+mn-lt"/>
+                <a:ea typeface="+mn-ea"/>
+                <a:cs typeface="+mn-cs"/>
+              </a:defRPr>
+            </a:lvl8pPr>
+            <a:lvl9pPr marL="2914650" indent="-171450" algn="l" defTabSz="342900" rtl="0" eaLnBrk="1" latinLnBrk="0" hangingPunct="1">
+              <a:spcBef>
+                <a:spcPct val="20000"/>
+              </a:spcBef>
+              <a:buFont typeface="Arial"/>
+              <a:buChar char="•"/>
+              <a:defRPr sz="1500" kern="1200">
+                <a:solidFill>
+                  <a:schemeClr val="tx1"/>
+                </a:solidFill>
+                <a:latin typeface="+mn-lt"/>
+                <a:ea typeface="+mn-ea"/>
+                <a:cs typeface="+mn-cs"/>
+              </a:defRPr>
+            </a:lvl9pPr>
+          </a:lstStyle>
+          <a:p>
+            <a:r>
+              <a:rPr lang="de-DE" dirty="0" err="1"/>
+              <a:t>Example</a:t>
+            </a:r>
+            <a:r>
+              <a:rPr lang="de-DE" dirty="0"/>
+              <a:t> „real </a:t>
+            </a:r>
+            <a:r>
+              <a:rPr lang="de-DE" dirty="0" err="1"/>
+              <a:t>lens</a:t>
+            </a:r>
+            <a:r>
+              <a:rPr lang="de-DE" dirty="0"/>
+              <a:t>“</a:t>
+            </a:r>
+          </a:p>
+        </p:txBody>
+      </p:sp>
+      <p:pic>
+        <p:nvPicPr>
+          <p:cNvPr id="9" name="Grafik 8">
+            <a:extLst>
+              <a:ext uri="{FF2B5EF4-FFF2-40B4-BE49-F238E27FC236}">
+                <a16:creationId xmlns:a16="http://schemas.microsoft.com/office/drawing/2014/main" id="{7C89F4CA-68F2-453E-A29B-459B42641AA1}"/>
+              </a:ext>
+            </a:extLst>
+          </p:cNvPr>
+          <p:cNvPicPr>
+            <a:picLocks noChangeAspect="1"/>
+          </p:cNvPicPr>
+          <p:nvPr/>
+        </p:nvPicPr>
+        <p:blipFill>
+          <a:blip r:embed="rId4">
+            <a:extLst>
+              <a:ext uri="{96DAC541-7B7A-43D3-8B79-37D633B846F1}">
+                <asvg:svgBlip xmlns:asvg="http://schemas.microsoft.com/office/drawing/2016/SVG/main" r:embed="rId5"/>
+              </a:ext>
+            </a:extLst>
+          </a:blip>
+          <a:stretch>
+            <a:fillRect/>
+          </a:stretch>
+        </p:blipFill>
+        <p:spPr>
+          <a:xfrm>
+            <a:off x="2102391" y="3570237"/>
+            <a:ext cx="581025" cy="990600"/>
+          </a:xfrm>
+          <a:prstGeom prst="rect">
+            <a:avLst/>
+          </a:prstGeom>
+        </p:spPr>
+      </p:pic>
+      <p:pic>
+        <p:nvPicPr>
+          <p:cNvPr id="11" name="Grafik 10">
+            <a:extLst>
+              <a:ext uri="{FF2B5EF4-FFF2-40B4-BE49-F238E27FC236}">
+                <a16:creationId xmlns:a16="http://schemas.microsoft.com/office/drawing/2014/main" id="{3FBBD814-DD47-403F-B8AA-CD32485D0273}"/>
+              </a:ext>
+            </a:extLst>
+          </p:cNvPr>
+          <p:cNvPicPr>
+            <a:picLocks noChangeAspect="1"/>
+          </p:cNvPicPr>
+          <p:nvPr/>
+        </p:nvPicPr>
+        <p:blipFill>
+          <a:blip r:embed="rId6">
+            <a:extLst>
+              <a:ext uri="{96DAC541-7B7A-43D3-8B79-37D633B846F1}">
+                <asvg:svgBlip xmlns:asvg="http://schemas.microsoft.com/office/drawing/2016/SVG/main" r:embed="rId7"/>
+              </a:ext>
+            </a:extLst>
+          </a:blip>
+          <a:stretch>
+            <a:fillRect/>
+          </a:stretch>
+        </p:blipFill>
+        <p:spPr>
+          <a:xfrm>
+            <a:off x="4086514" y="3261920"/>
+            <a:ext cx="4026209" cy="1436690"/>
+          </a:xfrm>
+          <a:prstGeom prst="rect">
+            <a:avLst/>
+          </a:prstGeom>
+        </p:spPr>
+      </p:pic>
+      <p:sp>
+        <p:nvSpPr>
+          <p:cNvPr id="12" name="Pfeil: nach rechts 11">
+            <a:extLst>
+              <a:ext uri="{FF2B5EF4-FFF2-40B4-BE49-F238E27FC236}">
+                <a16:creationId xmlns:a16="http://schemas.microsoft.com/office/drawing/2014/main" id="{DB5B4C82-2C24-4092-B319-1E6CE90C559F}"/>
+              </a:ext>
+            </a:extLst>
+          </p:cNvPr>
+          <p:cNvSpPr/>
+          <p:nvPr/>
+        </p:nvSpPr>
+        <p:spPr>
+          <a:xfrm>
+            <a:off x="3065264" y="3821468"/>
+            <a:ext cx="680644" cy="488138"/>
+          </a:xfrm>
+          <a:prstGeom prst="rightArrow">
+            <a:avLst/>
+          </a:prstGeom>
+          <a:solidFill>
+            <a:srgbClr val="FDBB63"/>
+          </a:solidFill>
+          <a:ln>
+            <a:noFill/>
+          </a:ln>
+          <a:effectLst/>
+        </p:spPr>
+        <p:style>
+          <a:lnRef idx="1">
+            <a:schemeClr val="accent1"/>
+          </a:lnRef>
+          <a:fillRef idx="3">
+            <a:schemeClr val="accent1"/>
+          </a:fillRef>
+          <a:effectRef idx="2">
+            <a:schemeClr val="accent1"/>
+          </a:effectRef>
+          <a:fontRef idx="minor">
+            <a:schemeClr val="lt1"/>
+          </a:fontRef>
+        </p:style>
+        <p:txBody>
+          <a:bodyPr rot="0" spcFirstLastPara="0" vertOverflow="overflow" horzOverflow="overflow" vert="horz" wrap="square" lIns="91440" tIns="45720" rIns="91440" bIns="45720" numCol="1" spcCol="0" rtlCol="0" fromWordArt="0" anchor="ctr" anchorCtr="0" forceAA="0" compatLnSpc="1">
+            <a:prstTxWarp prst="textNoShape">
+              <a:avLst/>
+            </a:prstTxWarp>
+            <a:noAutofit/>
+          </a:bodyPr>
+          <a:lstStyle/>
+          <a:p>
+            <a:pPr algn="ctr"/>
+            <a:endParaRPr lang="de-DE"/>
+          </a:p>
+        </p:txBody>
+      </p:sp>
+    </p:spTree>
+    <p:extLst>
+      <p:ext uri="{BB962C8B-B14F-4D97-AF65-F5344CB8AC3E}">
+        <p14:creationId xmlns:p14="http://schemas.microsoft.com/office/powerpoint/2010/main" val="3521904287"/>
+      </p:ext>
+    </p:extLst>
+  </p:cSld>
+  <p:clrMapOvr>
+    <a:masterClrMapping/>
+  </p:clrMapOvr>
+</p:sld>
+</file>
+
+<file path=ppt/slides/slide8.xml><?xml version="1.0" encoding="utf-8"?>
 <p:sld xmlns:a="http://schemas.openxmlformats.org/drawingml/2006/main" xmlns:r="http://schemas.openxmlformats.org/officeDocument/2006/relationships" xmlns:p="http://schemas.openxmlformats.org/presentationml/2006/main">
   <p:cSld>
     <p:spTree>
@@ -5141,7 +6798,7 @@
 </p:sld>
 </file>
 
-<file path=ppt/slides/slide8.xml><?xml version="1.0" encoding="utf-8"?>
+<file path=ppt/slides/slide9.xml><?xml version="1.0" encoding="utf-8"?>
 <p:sld xmlns:a="http://schemas.openxmlformats.org/drawingml/2006/main" xmlns:r="http://schemas.openxmlformats.org/officeDocument/2006/relationships" xmlns:p="http://schemas.openxmlformats.org/presentationml/2006/main">
   <p:cSld>
     <p:spTree>
@@ -5512,266 +7169,6 @@
     <p:extLst>
       <p:ext uri="{BB962C8B-B14F-4D97-AF65-F5344CB8AC3E}">
         <p14:creationId xmlns:p14="http://schemas.microsoft.com/office/powerpoint/2010/main" val="2818766969"/>
-      </p:ext>
-    </p:extLst>
-  </p:cSld>
-  <p:clrMapOvr>
-    <a:masterClrMapping/>
-  </p:clrMapOvr>
-</p:sld>
-</file>
-
-<file path=ppt/slides/slide9.xml><?xml version="1.0" encoding="utf-8"?>
-<p:sld xmlns:a="http://schemas.openxmlformats.org/drawingml/2006/main" xmlns:r="http://schemas.openxmlformats.org/officeDocument/2006/relationships" xmlns:p="http://schemas.openxmlformats.org/presentationml/2006/main">
-  <p:cSld>
-    <p:spTree>
-      <p:nvGrpSpPr>
-        <p:cNvPr id="1" name=""/>
-        <p:cNvGrpSpPr/>
-        <p:nvPr/>
-      </p:nvGrpSpPr>
-      <p:grpSpPr>
-        <a:xfrm>
-          <a:off x="0" y="0"/>
-          <a:ext cx="0" cy="0"/>
-          <a:chOff x="0" y="0"/>
-          <a:chExt cx="0" cy="0"/>
-        </a:xfrm>
-      </p:grpSpPr>
-      <p:sp>
-        <p:nvSpPr>
-          <p:cNvPr id="2" name="Titel 1">
-            <a:extLst>
-              <a:ext uri="{FF2B5EF4-FFF2-40B4-BE49-F238E27FC236}">
-                <a16:creationId xmlns:a16="http://schemas.microsoft.com/office/drawing/2014/main" id="{AADACEB8-D172-4E49-B819-AE4A0A0F2CA2}"/>
-              </a:ext>
-            </a:extLst>
-          </p:cNvPr>
-          <p:cNvSpPr>
-            <a:spLocks noGrp="1"/>
-          </p:cNvSpPr>
-          <p:nvPr>
-            <p:ph type="title"/>
-          </p:nvPr>
-        </p:nvSpPr>
-        <p:spPr/>
-        <p:txBody>
-          <a:bodyPr/>
-          <a:lstStyle/>
-          <a:p>
-            <a:r>
-              <a:rPr lang="de-DE" dirty="0"/>
-              <a:t>Outlook</a:t>
-            </a:r>
-          </a:p>
-        </p:txBody>
-      </p:sp>
-      <p:sp>
-        <p:nvSpPr>
-          <p:cNvPr id="3" name="Inhaltsplatzhalter 2">
-            <a:extLst>
-              <a:ext uri="{FF2B5EF4-FFF2-40B4-BE49-F238E27FC236}">
-                <a16:creationId xmlns:a16="http://schemas.microsoft.com/office/drawing/2014/main" id="{7AF4AFA8-D129-4BB0-9DA8-97D9440E97BF}"/>
-              </a:ext>
-            </a:extLst>
-          </p:cNvPr>
-          <p:cNvSpPr>
-            <a:spLocks noGrp="1"/>
-          </p:cNvSpPr>
-          <p:nvPr>
-            <p:ph idx="1"/>
-          </p:nvPr>
-        </p:nvSpPr>
-        <p:spPr/>
-        <p:txBody>
-          <a:bodyPr/>
-          <a:lstStyle/>
-          <a:p>
-            <a:r>
-              <a:rPr lang="de-DE" dirty="0" err="1"/>
-              <a:t>planned</a:t>
-            </a:r>
-            <a:r>
-              <a:rPr lang="de-DE" dirty="0"/>
-              <a:t> </a:t>
-            </a:r>
-            <a:r>
-              <a:rPr lang="de-DE" dirty="0" err="1"/>
-              <a:t>milestones</a:t>
-            </a:r>
-            <a:r>
-              <a:rPr lang="de-DE" dirty="0"/>
-              <a:t>:</a:t>
-            </a:r>
-          </a:p>
-          <a:p>
-            <a:pPr lvl="1"/>
-            <a:r>
-              <a:rPr lang="de-DE" dirty="0"/>
-              <a:t>v0.3: </a:t>
-            </a:r>
-            <a:r>
-              <a:rPr lang="de-DE" dirty="0" err="1"/>
-              <a:t>implementation</a:t>
-            </a:r>
-            <a:r>
-              <a:rPr lang="de-DE" dirty="0"/>
-              <a:t> </a:t>
-            </a:r>
-            <a:r>
-              <a:rPr lang="de-DE" dirty="0" err="1"/>
-              <a:t>of</a:t>
-            </a:r>
-            <a:r>
-              <a:rPr lang="de-DE" dirty="0"/>
-              <a:t> </a:t>
-            </a:r>
-            <a:r>
-              <a:rPr lang="de-DE" dirty="0" err="1"/>
-              <a:t>basic</a:t>
-            </a:r>
-            <a:r>
-              <a:rPr lang="de-DE" dirty="0"/>
-              <a:t> </a:t>
-            </a:r>
-            <a:r>
-              <a:rPr lang="de-DE" dirty="0" err="1"/>
-              <a:t>ray</a:t>
-            </a:r>
-            <a:r>
-              <a:rPr lang="de-DE" dirty="0"/>
-              <a:t> </a:t>
-            </a:r>
-            <a:r>
-              <a:rPr lang="de-DE" dirty="0" err="1"/>
-              <a:t>tracing</a:t>
-            </a:r>
-            <a:r>
-              <a:rPr lang="de-DE" dirty="0"/>
-              <a:t> (</a:t>
-            </a:r>
-            <a:r>
-              <a:rPr lang="de-DE" dirty="0" err="1"/>
-              <a:t>wavelength</a:t>
-            </a:r>
-            <a:r>
-              <a:rPr lang="de-DE" dirty="0"/>
-              <a:t> and </a:t>
-            </a:r>
-            <a:r>
-              <a:rPr lang="de-DE" dirty="0" err="1"/>
-              <a:t>polarization</a:t>
-            </a:r>
-            <a:r>
-              <a:rPr lang="de-DE" dirty="0"/>
-              <a:t> </a:t>
-            </a:r>
-            <a:r>
-              <a:rPr lang="de-DE" dirty="0" err="1"/>
-              <a:t>dependent</a:t>
-            </a:r>
-            <a:r>
-              <a:rPr lang="de-DE" dirty="0"/>
-              <a:t>)</a:t>
-            </a:r>
-          </a:p>
-          <a:p>
-            <a:pPr lvl="1"/>
-            <a:r>
-              <a:rPr lang="de-DE" dirty="0"/>
-              <a:t>v0.4: </a:t>
-            </a:r>
-            <a:r>
-              <a:rPr lang="de-DE" dirty="0" err="1"/>
-              <a:t>inclusion</a:t>
-            </a:r>
-            <a:r>
-              <a:rPr lang="de-DE" dirty="0"/>
-              <a:t> </a:t>
-            </a:r>
-            <a:r>
-              <a:rPr lang="de-DE" dirty="0" err="1"/>
-              <a:t>of</a:t>
-            </a:r>
-            <a:r>
-              <a:rPr lang="de-DE" dirty="0"/>
-              <a:t> </a:t>
-            </a:r>
-            <a:r>
-              <a:rPr lang="de-DE" dirty="0" err="1"/>
-              <a:t>first</a:t>
-            </a:r>
-            <a:r>
-              <a:rPr lang="de-DE" dirty="0"/>
-              <a:t> external code (Python </a:t>
-            </a:r>
-            <a:r>
-              <a:rPr lang="de-DE" dirty="0" err="1"/>
-              <a:t>module</a:t>
-            </a:r>
-            <a:r>
-              <a:rPr lang="de-DE" dirty="0"/>
-              <a:t>: SHG </a:t>
-            </a:r>
-            <a:r>
-              <a:rPr lang="de-DE" dirty="0" err="1"/>
-              <a:t>simulation</a:t>
-            </a:r>
-            <a:r>
-              <a:rPr lang="de-DE" dirty="0"/>
-              <a:t> </a:t>
-            </a:r>
-            <a:r>
-              <a:rPr lang="de-DE" dirty="0" err="1"/>
-              <a:t>by</a:t>
-            </a:r>
-            <a:r>
-              <a:rPr lang="de-DE" dirty="0"/>
-              <a:t> M. Malki)</a:t>
-            </a:r>
-          </a:p>
-        </p:txBody>
-      </p:sp>
-      <p:pic>
-        <p:nvPicPr>
-          <p:cNvPr id="4" name="Grafik 3">
-            <a:extLst>
-              <a:ext uri="{FF2B5EF4-FFF2-40B4-BE49-F238E27FC236}">
-                <a16:creationId xmlns:a16="http://schemas.microsoft.com/office/drawing/2014/main" id="{C6595470-9348-41C7-A073-677AC1627BC1}"/>
-              </a:ext>
-            </a:extLst>
-          </p:cNvPr>
-          <p:cNvPicPr>
-            <a:picLocks noChangeAspect="1"/>
-          </p:cNvPicPr>
-          <p:nvPr/>
-        </p:nvPicPr>
-        <p:blipFill>
-          <a:blip r:embed="rId2">
-            <a:extLst>
-              <a:ext uri="{96DAC541-7B7A-43D3-8B79-37D633B846F1}">
-                <asvg:svgBlip xmlns:asvg="http://schemas.microsoft.com/office/drawing/2016/SVG/main" r:embed="rId3"/>
-              </a:ext>
-            </a:extLst>
-          </a:blip>
-          <a:stretch>
-            <a:fillRect/>
-          </a:stretch>
-        </p:blipFill>
-        <p:spPr>
-          <a:xfrm>
-            <a:off x="2286001" y="2975414"/>
-            <a:ext cx="1433236" cy="1433236"/>
-          </a:xfrm>
-          <a:prstGeom prst="rect">
-            <a:avLst/>
-          </a:prstGeom>
-        </p:spPr>
-      </p:pic>
-    </p:spTree>
-    <p:extLst>
-      <p:ext uri="{BB962C8B-B14F-4D97-AF65-F5344CB8AC3E}">
-        <p14:creationId xmlns:p14="http://schemas.microsoft.com/office/powerpoint/2010/main" val="1056657431"/>
       </p:ext>
     </p:extLst>
   </p:cSld>

</xml_diff>